<commit_message>
Data Science w/ Adv. Python docs-update
</commit_message>
<xml_diff>
--- a/data-science-adv-python/Data Science w Advanced Python.pptx
+++ b/data-science-adv-python/Data Science w Advanced Python.pptx
@@ -16,8 +16,8 @@
     <p:sldId id="284" r:id="rId10"/>
     <p:sldId id="287" r:id="rId11"/>
     <p:sldId id="285" r:id="rId12"/>
-    <p:sldId id="262" r:id="rId13"/>
-    <p:sldId id="288" r:id="rId14"/>
+    <p:sldId id="288" r:id="rId13"/>
+    <p:sldId id="289" r:id="rId14"/>
     <p:sldId id="276" r:id="rId15"/>
   </p:sldIdLst>
   <p:sldSz cx="12192000" cy="6858000"/>
@@ -117,6 +117,11 @@
       </a:defRPr>
     </a:lvl9pPr>
   </p:defaultTextStyle>
+  <p:extLst>
+    <p:ext uri="{EFAFB233-063F-42B5-8137-9DF3F51BA10A}">
+      <p15:sldGuideLst xmlns:p15="http://schemas.microsoft.com/office/powerpoint/2012/main"/>
+    </p:ext>
+  </p:extLst>
 </p:presentation>
 </file>
 
@@ -841,7 +846,7 @@
           <a:p>
             <a:fld id="{7A9118D1-1B31-41C2-A8E6-5B8E81C10E1C}" type="datetimeFigureOut">
               <a:rPr lang="en-IN" smtClean="0"/>
-              <a:t>19-11-2022</a:t>
+              <a:t>21-11-2022</a:t>
             </a:fld>
             <a:endParaRPr lang="en-IN"/>
           </a:p>
@@ -1104,7 +1109,7 @@
           <a:p>
             <a:fld id="{7A9118D1-1B31-41C2-A8E6-5B8E81C10E1C}" type="datetimeFigureOut">
               <a:rPr lang="en-IN" smtClean="0"/>
-              <a:t>19-11-2022</a:t>
+              <a:t>21-11-2022</a:t>
             </a:fld>
             <a:endParaRPr lang="en-IN"/>
           </a:p>
@@ -1355,7 +1360,7 @@
           <a:p>
             <a:fld id="{7A9118D1-1B31-41C2-A8E6-5B8E81C10E1C}" type="datetimeFigureOut">
               <a:rPr lang="en-IN" smtClean="0"/>
-              <a:t>19-11-2022</a:t>
+              <a:t>21-11-2022</a:t>
             </a:fld>
             <a:endParaRPr lang="en-IN"/>
           </a:p>
@@ -1669,7 +1674,7 @@
           <a:p>
             <a:fld id="{7A9118D1-1B31-41C2-A8E6-5B8E81C10E1C}" type="datetimeFigureOut">
               <a:rPr lang="en-IN" smtClean="0"/>
-              <a:t>19-11-2022</a:t>
+              <a:t>21-11-2022</a:t>
             </a:fld>
             <a:endParaRPr lang="en-IN"/>
           </a:p>
@@ -2010,7 +2015,7 @@
           <a:p>
             <a:fld id="{7A9118D1-1B31-41C2-A8E6-5B8E81C10E1C}" type="datetimeFigureOut">
               <a:rPr lang="en-IN" smtClean="0"/>
-              <a:t>19-11-2022</a:t>
+              <a:t>21-11-2022</a:t>
             </a:fld>
             <a:endParaRPr lang="en-IN"/>
           </a:p>
@@ -2324,7 +2329,7 @@
           <a:p>
             <a:fld id="{7A9118D1-1B31-41C2-A8E6-5B8E81C10E1C}" type="datetimeFigureOut">
               <a:rPr lang="en-IN" smtClean="0"/>
-              <a:t>19-11-2022</a:t>
+              <a:t>21-11-2022</a:t>
             </a:fld>
             <a:endParaRPr lang="en-IN"/>
           </a:p>
@@ -2717,7 +2722,7 @@
           <a:p>
             <a:fld id="{7A9118D1-1B31-41C2-A8E6-5B8E81C10E1C}" type="datetimeFigureOut">
               <a:rPr lang="en-IN" smtClean="0"/>
-              <a:t>19-11-2022</a:t>
+              <a:t>21-11-2022</a:t>
             </a:fld>
             <a:endParaRPr lang="en-IN"/>
           </a:p>
@@ -2887,7 +2892,7 @@
           <a:p>
             <a:fld id="{7A9118D1-1B31-41C2-A8E6-5B8E81C10E1C}" type="datetimeFigureOut">
               <a:rPr lang="en-IN" smtClean="0"/>
-              <a:t>19-11-2022</a:t>
+              <a:t>21-11-2022</a:t>
             </a:fld>
             <a:endParaRPr lang="en-IN"/>
           </a:p>
@@ -3067,7 +3072,7 @@
           <a:p>
             <a:fld id="{7A9118D1-1B31-41C2-A8E6-5B8E81C10E1C}" type="datetimeFigureOut">
               <a:rPr lang="en-IN" smtClean="0"/>
-              <a:t>19-11-2022</a:t>
+              <a:t>21-11-2022</a:t>
             </a:fld>
             <a:endParaRPr lang="en-IN"/>
           </a:p>
@@ -3277,7 +3282,7 @@
           <a:p>
             <a:fld id="{EBBFA983-B8F2-455D-9C39-92378F55643C}" type="datetimeFigureOut">
               <a:rPr lang="en-IN" smtClean="0"/>
-              <a:t>19-11-2022</a:t>
+              <a:t>21-11-2022</a:t>
             </a:fld>
             <a:endParaRPr lang="en-IN"/>
           </a:p>
@@ -3477,7 +3482,7 @@
           <a:p>
             <a:fld id="{EBBFA983-B8F2-455D-9C39-92378F55643C}" type="datetimeFigureOut">
               <a:rPr lang="en-IN" smtClean="0"/>
-              <a:t>19-11-2022</a:t>
+              <a:t>21-11-2022</a:t>
             </a:fld>
             <a:endParaRPr lang="en-IN"/>
           </a:p>
@@ -3619,7 +3624,7 @@
           <a:p>
             <a:fld id="{7A9118D1-1B31-41C2-A8E6-5B8E81C10E1C}" type="datetimeFigureOut">
               <a:rPr lang="en-IN" smtClean="0"/>
-              <a:t>19-11-2022</a:t>
+              <a:t>21-11-2022</a:t>
             </a:fld>
             <a:endParaRPr lang="en-IN"/>
           </a:p>
@@ -3895,7 +3900,7 @@
           <a:p>
             <a:fld id="{EBBFA983-B8F2-455D-9C39-92378F55643C}" type="datetimeFigureOut">
               <a:rPr lang="en-IN" smtClean="0"/>
-              <a:t>19-11-2022</a:t>
+              <a:t>21-11-2022</a:t>
             </a:fld>
             <a:endParaRPr lang="en-IN"/>
           </a:p>
@@ -4163,7 +4168,7 @@
           <a:p>
             <a:fld id="{EBBFA983-B8F2-455D-9C39-92378F55643C}" type="datetimeFigureOut">
               <a:rPr lang="en-IN" smtClean="0"/>
-              <a:t>19-11-2022</a:t>
+              <a:t>21-11-2022</a:t>
             </a:fld>
             <a:endParaRPr lang="en-IN"/>
           </a:p>
@@ -4578,7 +4583,7 @@
           <a:p>
             <a:fld id="{EBBFA983-B8F2-455D-9C39-92378F55643C}" type="datetimeFigureOut">
               <a:rPr lang="en-IN" smtClean="0"/>
-              <a:t>19-11-2022</a:t>
+              <a:t>21-11-2022</a:t>
             </a:fld>
             <a:endParaRPr lang="en-IN"/>
           </a:p>
@@ -4720,7 +4725,7 @@
           <a:p>
             <a:fld id="{EBBFA983-B8F2-455D-9C39-92378F55643C}" type="datetimeFigureOut">
               <a:rPr lang="en-IN" smtClean="0"/>
-              <a:t>19-11-2022</a:t>
+              <a:t>21-11-2022</a:t>
             </a:fld>
             <a:endParaRPr lang="en-IN"/>
           </a:p>
@@ -4833,7 +4838,7 @@
           <a:p>
             <a:fld id="{EBBFA983-B8F2-455D-9C39-92378F55643C}" type="datetimeFigureOut">
               <a:rPr lang="en-IN" smtClean="0"/>
-              <a:t>19-11-2022</a:t>
+              <a:t>21-11-2022</a:t>
             </a:fld>
             <a:endParaRPr lang="en-IN"/>
           </a:p>
@@ -5146,7 +5151,7 @@
           <a:p>
             <a:fld id="{EBBFA983-B8F2-455D-9C39-92378F55643C}" type="datetimeFigureOut">
               <a:rPr lang="en-IN" smtClean="0"/>
-              <a:t>19-11-2022</a:t>
+              <a:t>21-11-2022</a:t>
             </a:fld>
             <a:endParaRPr lang="en-IN"/>
           </a:p>
@@ -5435,7 +5440,7 @@
           <a:p>
             <a:fld id="{EBBFA983-B8F2-455D-9C39-92378F55643C}" type="datetimeFigureOut">
               <a:rPr lang="en-IN" smtClean="0"/>
-              <a:t>19-11-2022</a:t>
+              <a:t>21-11-2022</a:t>
             </a:fld>
             <a:endParaRPr lang="en-IN"/>
           </a:p>
@@ -5635,7 +5640,7 @@
           <a:p>
             <a:fld id="{EBBFA983-B8F2-455D-9C39-92378F55643C}" type="datetimeFigureOut">
               <a:rPr lang="en-IN" smtClean="0"/>
-              <a:t>19-11-2022</a:t>
+              <a:t>21-11-2022</a:t>
             </a:fld>
             <a:endParaRPr lang="en-IN"/>
           </a:p>
@@ -5845,7 +5850,7 @@
           <a:p>
             <a:fld id="{EBBFA983-B8F2-455D-9C39-92378F55643C}" type="datetimeFigureOut">
               <a:rPr lang="en-IN" smtClean="0"/>
-              <a:t>19-11-2022</a:t>
+              <a:t>21-11-2022</a:t>
             </a:fld>
             <a:endParaRPr lang="en-IN"/>
           </a:p>
@@ -6033,7 +6038,7 @@
           <a:p>
             <a:fld id="{7A9118D1-1B31-41C2-A8E6-5B8E81C10E1C}" type="datetimeFigureOut">
               <a:rPr lang="en-IN" smtClean="0"/>
-              <a:t>19-11-2022</a:t>
+              <a:t>21-11-2022</a:t>
             </a:fld>
             <a:endParaRPr lang="en-IN"/>
           </a:p>
@@ -6280,7 +6285,7 @@
           <a:p>
             <a:fld id="{7A9118D1-1B31-41C2-A8E6-5B8E81C10E1C}" type="datetimeFigureOut">
               <a:rPr lang="en-IN" smtClean="0"/>
-              <a:t>19-11-2022</a:t>
+              <a:t>21-11-2022</a:t>
             </a:fld>
             <a:endParaRPr lang="en-IN"/>
           </a:p>
@@ -6512,7 +6517,7 @@
           <a:p>
             <a:fld id="{7A9118D1-1B31-41C2-A8E6-5B8E81C10E1C}" type="datetimeFigureOut">
               <a:rPr lang="en-IN" smtClean="0"/>
-              <a:t>19-11-2022</a:t>
+              <a:t>21-11-2022</a:t>
             </a:fld>
             <a:endParaRPr lang="en-IN"/>
           </a:p>
@@ -6886,7 +6891,7 @@
           <a:p>
             <a:fld id="{7A9118D1-1B31-41C2-A8E6-5B8E81C10E1C}" type="datetimeFigureOut">
               <a:rPr lang="en-IN" smtClean="0"/>
-              <a:t>19-11-2022</a:t>
+              <a:t>21-11-2022</a:t>
             </a:fld>
             <a:endParaRPr lang="en-IN"/>
           </a:p>
@@ -7009,7 +7014,7 @@
           <a:p>
             <a:fld id="{7A9118D1-1B31-41C2-A8E6-5B8E81C10E1C}" type="datetimeFigureOut">
               <a:rPr lang="en-IN" smtClean="0"/>
-              <a:t>19-11-2022</a:t>
+              <a:t>21-11-2022</a:t>
             </a:fld>
             <a:endParaRPr lang="en-IN"/>
           </a:p>
@@ -7104,7 +7109,7 @@
           <a:p>
             <a:fld id="{7A9118D1-1B31-41C2-A8E6-5B8E81C10E1C}" type="datetimeFigureOut">
               <a:rPr lang="en-IN" smtClean="0"/>
-              <a:t>19-11-2022</a:t>
+              <a:t>21-11-2022</a:t>
             </a:fld>
             <a:endParaRPr lang="en-IN"/>
           </a:p>
@@ -7359,7 +7364,7 @@
           <a:p>
             <a:fld id="{7A9118D1-1B31-41C2-A8E6-5B8E81C10E1C}" type="datetimeFigureOut">
               <a:rPr lang="en-IN" smtClean="0"/>
-              <a:t>19-11-2022</a:t>
+              <a:t>21-11-2022</a:t>
             </a:fld>
             <a:endParaRPr lang="en-IN"/>
           </a:p>
@@ -8102,7 +8107,7 @@
           <a:p>
             <a:fld id="{7A9118D1-1B31-41C2-A8E6-5B8E81C10E1C}" type="datetimeFigureOut">
               <a:rPr lang="en-IN" smtClean="0"/>
-              <a:t>19-11-2022</a:t>
+              <a:t>21-11-2022</a:t>
             </a:fld>
             <a:endParaRPr lang="en-IN"/>
           </a:p>
@@ -8780,7 +8785,7 @@
           <a:p>
             <a:fld id="{EBBFA983-B8F2-455D-9C39-92378F55643C}" type="datetimeFigureOut">
               <a:rPr lang="en-IN" smtClean="0"/>
-              <a:t>19-11-2022</a:t>
+              <a:t>21-11-2022</a:t>
             </a:fld>
             <a:endParaRPr lang="en-IN"/>
           </a:p>
@@ -9606,7 +9611,7 @@
             <a:pPr algn="l"/>
             <a:r>
               <a:rPr lang="en-US" dirty="0"/>
-              <a:t>Charting</a:t>
+              <a:t>Date handling</a:t>
             </a:r>
             <a:endParaRPr lang="en-IN" dirty="0"/>
           </a:p>
@@ -9631,11 +9636,13 @@
         <p:spPr>
           <a:xfrm>
             <a:off x="1321537" y="2112294"/>
-            <a:ext cx="7766936" cy="1096899"/>
+            <a:ext cx="7766936" cy="2791010"/>
           </a:xfrm>
         </p:spPr>
         <p:txBody>
-          <a:bodyPr/>
+          <a:bodyPr>
+            <a:normAutofit/>
+          </a:bodyPr>
           <a:lstStyle/>
           <a:p>
             <a:pPr marL="285750" indent="-285750" algn="l">
@@ -9644,8 +9651,97 @@
             </a:pPr>
             <a:r>
               <a:rPr lang="en-US" dirty="0"/>
-              <a:t>To present concepts like Data Science and Machine Learning in a simple, illustrative way</a:t>
-            </a:r>
+              <a:t>Creating a </a:t>
+            </a:r>
+            <a:r>
+              <a:rPr lang="en-US" dirty="0" err="1"/>
+              <a:t>medical_table</a:t>
+            </a:r>
+            <a:r>
+              <a:rPr lang="en-US" dirty="0"/>
+              <a:t> dataframe to demonstrate date handling</a:t>
+            </a:r>
+          </a:p>
+          <a:p>
+            <a:pPr marL="285750" indent="-285750" algn="l">
+              <a:buFont typeface="Arial" panose="020B0604020202020204" pitchFamily="34" charset="0"/>
+              <a:buChar char="•"/>
+            </a:pPr>
+            <a:r>
+              <a:rPr lang="en-US" dirty="0"/>
+              <a:t>Creating a datetime variable</a:t>
+            </a:r>
+          </a:p>
+          <a:p>
+            <a:pPr lvl="1" indent="-285750" algn="l">
+              <a:buFont typeface="Arial" panose="020B0604020202020204" pitchFamily="34" charset="0"/>
+              <a:buChar char="•"/>
+            </a:pPr>
+            <a:r>
+              <a:rPr lang="en-US" b="1" dirty="0" err="1"/>
+              <a:t>pd.date_range</a:t>
+            </a:r>
+            <a:r>
+              <a:rPr lang="en-US" b="1" dirty="0"/>
+              <a:t>() </a:t>
+            </a:r>
+            <a:r>
+              <a:rPr lang="en-US" dirty="0"/>
+              <a:t>method</a:t>
+            </a:r>
+          </a:p>
+          <a:p>
+            <a:r>
+              <a:rPr lang="en-US" b="1" dirty="0"/>
+              <a:t>Formatting</a:t>
+            </a:r>
+          </a:p>
+          <a:p>
+            <a:pPr marL="571500"/>
+            <a:r>
+              <a:rPr lang="en-US" sz="1600" b="1" dirty="0" err="1"/>
+              <a:t>re.sub</a:t>
+            </a:r>
+            <a:r>
+              <a:rPr lang="en-US" sz="1600" b="1" dirty="0"/>
+              <a:t>() </a:t>
+            </a:r>
+            <a:r>
+              <a:rPr lang="en-US" sz="1600" dirty="0"/>
+              <a:t>method</a:t>
+            </a:r>
+          </a:p>
+          <a:p>
+            <a:pPr marL="571500"/>
+            <a:r>
+              <a:rPr lang="en-US" sz="1600" b="1" dirty="0"/>
+              <a:t>apply() </a:t>
+            </a:r>
+            <a:r>
+              <a:rPr lang="en-US" sz="1600" dirty="0"/>
+              <a:t>method</a:t>
+            </a:r>
+            <a:endParaRPr lang="en-US" sz="1600" b="1" dirty="0"/>
+          </a:p>
+          <a:p>
+            <a:pPr marL="571500"/>
+            <a:r>
+              <a:rPr lang="en-US" sz="1600" b="1" dirty="0" err="1"/>
+              <a:t>datetime.datetime.strptime</a:t>
+            </a:r>
+            <a:r>
+              <a:rPr lang="en-US" sz="1600" b="1" dirty="0"/>
+              <a:t>() </a:t>
+            </a:r>
+            <a:r>
+              <a:rPr lang="en-US" sz="1600" dirty="0"/>
+              <a:t>method (always returns YYYY-MM-DD)</a:t>
+            </a:r>
+            <a:endParaRPr lang="en-US" sz="1600" b="1" dirty="0"/>
+          </a:p>
+          <a:p>
+            <a:pPr lvl="1" algn="l"/>
+            <a:endParaRPr lang="en-US" b="1" dirty="0"/>
           </a:p>
           <a:p>
             <a:pPr marL="285750" indent="-285750" algn="l">
@@ -9659,7 +9755,7 @@
     </p:spTree>
     <p:extLst>
       <p:ext uri="{BB962C8B-B14F-4D97-AF65-F5344CB8AC3E}">
-        <p14:creationId xmlns:p14="http://schemas.microsoft.com/office/powerpoint/2010/main" val="653564702"/>
+        <p14:creationId xmlns:p14="http://schemas.microsoft.com/office/powerpoint/2010/main" val="2929089213"/>
       </p:ext>
     </p:extLst>
   </p:cSld>
@@ -9688,10 +9784,10 @@
       </p:grpSpPr>
       <p:sp>
         <p:nvSpPr>
-          <p:cNvPr id="2" name="Title 1">
+          <p:cNvPr id="5" name="Title 4">
             <a:extLst>
               <a:ext uri="{FF2B5EF4-FFF2-40B4-BE49-F238E27FC236}">
-                <a16:creationId xmlns:a16="http://schemas.microsoft.com/office/drawing/2014/main" id="{CB575C36-43B9-48EB-B0A8-E63053A094DA}"/>
+                <a16:creationId xmlns:a16="http://schemas.microsoft.com/office/drawing/2014/main" id="{7DD856E1-4C72-1F0B-9C58-69839D2F3D43}"/>
               </a:ext>
             </a:extLst>
           </p:cNvPr>
@@ -9704,63 +9800,19 @@
         </p:nvSpPr>
         <p:spPr>
           <a:xfrm>
-            <a:off x="1149258" y="1308242"/>
-            <a:ext cx="7766936" cy="804052"/>
+            <a:off x="1986106" y="2998528"/>
+            <a:ext cx="8219787" cy="860943"/>
           </a:xfrm>
         </p:spPr>
         <p:txBody>
           <a:bodyPr/>
           <a:lstStyle/>
           <a:p>
-            <a:pPr algn="l"/>
+            <a:pPr algn="ctr"/>
             <a:r>
               <a:rPr lang="en-US" dirty="0"/>
-              <a:t>Date handling</a:t>
-            </a:r>
-            <a:endParaRPr lang="en-IN" dirty="0"/>
-          </a:p>
-        </p:txBody>
-      </p:sp>
-      <p:sp>
-        <p:nvSpPr>
-          <p:cNvPr id="3" name="Subtitle 2">
-            <a:extLst>
-              <a:ext uri="{FF2B5EF4-FFF2-40B4-BE49-F238E27FC236}">
-                <a16:creationId xmlns:a16="http://schemas.microsoft.com/office/drawing/2014/main" id="{63D1DC60-7707-3A2E-E4B9-B25C393D84C4}"/>
-              </a:ext>
-            </a:extLst>
-          </p:cNvPr>
-          <p:cNvSpPr>
-            <a:spLocks noGrp="1"/>
-          </p:cNvSpPr>
-          <p:nvPr>
-            <p:ph type="subTitle" idx="1"/>
-          </p:nvPr>
-        </p:nvSpPr>
-        <p:spPr>
-          <a:xfrm>
-            <a:off x="1321537" y="2112294"/>
-            <a:ext cx="7766936" cy="1096899"/>
-          </a:xfrm>
-        </p:spPr>
-        <p:txBody>
-          <a:bodyPr/>
-          <a:lstStyle/>
-          <a:p>
-            <a:pPr marL="285750" indent="-285750" algn="l">
-              <a:buFont typeface="Arial" panose="020B0604020202020204" pitchFamily="34" charset="0"/>
-              <a:buChar char="•"/>
-            </a:pPr>
-            <a:r>
-              <a:rPr lang="en-US" dirty="0"/>
-              <a:t>To present concepts like Data Science and Machine Learning in a simple, illustrative way</a:t>
-            </a:r>
-          </a:p>
-          <a:p>
-            <a:pPr marL="285750" indent="-285750" algn="l">
-              <a:buFont typeface="Arial" panose="020B0604020202020204" pitchFamily="34" charset="0"/>
-              <a:buChar char="•"/>
-            </a:pPr>
+              <a:t>Thank You!</a:t>
+            </a:r>
             <a:endParaRPr lang="en-IN" dirty="0"/>
           </a:p>
         </p:txBody>
@@ -9768,7 +9820,7 @@
     </p:spTree>
     <p:extLst>
       <p:ext uri="{BB962C8B-B14F-4D97-AF65-F5344CB8AC3E}">
-        <p14:creationId xmlns:p14="http://schemas.microsoft.com/office/powerpoint/2010/main" val="2929089213"/>
+        <p14:creationId xmlns:p14="http://schemas.microsoft.com/office/powerpoint/2010/main" val="919043940"/>
       </p:ext>
     </p:extLst>
   </p:cSld>
@@ -9849,7 +9901,7 @@
         <p:spPr>
           <a:xfrm>
             <a:off x="1321537" y="954157"/>
-            <a:ext cx="7766936" cy="1096899"/>
+            <a:ext cx="7766936" cy="3697356"/>
           </a:xfrm>
         </p:spPr>
         <p:txBody>
@@ -9859,8 +9911,16 @@
           <a:lstStyle/>
           <a:p>
             <a:r>
+              <a:rPr lang="en-IN" sz="1200" dirty="0">
+                <a:solidFill>
+                  <a:schemeClr val="tx1"/>
+                </a:solidFill>
+              </a:rPr>
+              <a:t>Pandas resource</a:t>
+            </a:r>
+            <a:r>
               <a:rPr lang="en-IN" sz="1200" dirty="0"/>
-              <a:t>Pandas resource </a:t>
+              <a:t> </a:t>
             </a:r>
             <a:r>
               <a:rPr lang="en-IN" sz="1200" dirty="0" err="1">
@@ -9900,7 +9960,11 @@
           </a:p>
           <a:p>
             <a:r>
-              <a:rPr lang="en-IN" sz="1200" dirty="0"/>
+              <a:rPr lang="en-IN" sz="1200" dirty="0">
+                <a:solidFill>
+                  <a:schemeClr val="tx1"/>
+                </a:solidFill>
+              </a:rPr>
               <a:t>Read csv file into a dataframe </a:t>
             </a:r>
             <a:r>
@@ -9944,7 +10008,286 @@
               <a:buFont typeface="Arial" panose="020B0604020202020204" pitchFamily="34" charset="0"/>
               <a:buChar char="•"/>
             </a:pPr>
-            <a:endParaRPr lang="en-IN" sz="1200" dirty="0"/>
+            <a:r>
+              <a:rPr lang="en-IN" sz="1200" dirty="0">
+                <a:solidFill>
+                  <a:schemeClr val="tx1"/>
+                </a:solidFill>
+              </a:rPr>
+              <a:t>Pandas </a:t>
+            </a:r>
+            <a:r>
+              <a:rPr lang="en-IN" sz="1200" dirty="0" err="1">
+                <a:solidFill>
+                  <a:schemeClr val="tx1"/>
+                </a:solidFill>
+              </a:rPr>
+              <a:t>date_range</a:t>
+            </a:r>
+            <a:r>
+              <a:rPr lang="en-IN" sz="1200" dirty="0">
+                <a:solidFill>
+                  <a:schemeClr val="tx1"/>
+                </a:solidFill>
+              </a:rPr>
+              <a:t> </a:t>
+            </a:r>
+            <a:r>
+              <a:rPr lang="fr-FR" sz="1200" dirty="0" err="1">
+                <a:solidFill>
+                  <a:srgbClr val="0070C0"/>
+                </a:solidFill>
+                <a:hlinkClick r:id="rId4">
+                  <a:extLst>
+                    <a:ext uri="{A12FA001-AC4F-418D-AE19-62706E023703}">
+                      <ahyp:hlinkClr xmlns:ahyp="http://schemas.microsoft.com/office/drawing/2018/hyperlinkcolor" val="tx"/>
+                    </a:ext>
+                  </a:extLst>
+                </a:hlinkClick>
+              </a:rPr>
+              <a:t>pandas.date_range</a:t>
+            </a:r>
+            <a:r>
+              <a:rPr lang="fr-FR" sz="1200" dirty="0">
+                <a:solidFill>
+                  <a:srgbClr val="0070C0"/>
+                </a:solidFill>
+                <a:hlinkClick r:id="rId4">
+                  <a:extLst>
+                    <a:ext uri="{A12FA001-AC4F-418D-AE19-62706E023703}">
+                      <ahyp:hlinkClr xmlns:ahyp="http://schemas.microsoft.com/office/drawing/2018/hyperlinkcolor" val="tx"/>
+                    </a:ext>
+                  </a:extLst>
+                </a:hlinkClick>
+              </a:rPr>
+              <a:t> — pandas 1.5.1 documentation (pydata.org)</a:t>
+            </a:r>
+            <a:endParaRPr lang="fr-FR" sz="1200" dirty="0">
+              <a:solidFill>
+                <a:srgbClr val="0070C0"/>
+              </a:solidFill>
+            </a:endParaRPr>
+          </a:p>
+          <a:p>
+            <a:pPr marL="285750" indent="-285750" algn="l">
+              <a:buFont typeface="Arial" panose="020B0604020202020204" pitchFamily="34" charset="0"/>
+              <a:buChar char="•"/>
+            </a:pPr>
+            <a:r>
+              <a:rPr lang="en-IN" sz="1200" dirty="0">
+                <a:solidFill>
+                  <a:schemeClr val="tx1"/>
+                </a:solidFill>
+              </a:rPr>
+              <a:t>Random library </a:t>
+            </a:r>
+            <a:r>
+              <a:rPr lang="en-IN" sz="1200" dirty="0">
+                <a:solidFill>
+                  <a:srgbClr val="0070C0"/>
+                </a:solidFill>
+                <a:hlinkClick r:id="rId5">
+                  <a:extLst>
+                    <a:ext uri="{A12FA001-AC4F-418D-AE19-62706E023703}">
+                      <ahyp:hlinkClr xmlns:ahyp="http://schemas.microsoft.com/office/drawing/2018/hyperlinkcolor" val="tx"/>
+                    </a:ext>
+                  </a:extLst>
+                </a:hlinkClick>
+              </a:rPr>
+              <a:t>https://www.w3schools.com/python/module_random.asp</a:t>
+            </a:r>
+            <a:r>
+              <a:rPr lang="en-IN" sz="1200" dirty="0">
+                <a:solidFill>
+                  <a:srgbClr val="0070C0"/>
+                </a:solidFill>
+              </a:rPr>
+              <a:t> </a:t>
+            </a:r>
+          </a:p>
+          <a:p>
+            <a:pPr marL="285750" indent="-285750" algn="l">
+              <a:buFont typeface="Arial" panose="020B0604020202020204" pitchFamily="34" charset="0"/>
+              <a:buChar char="•"/>
+            </a:pPr>
+            <a:r>
+              <a:rPr lang="en-IN" sz="1200" dirty="0">
+                <a:solidFill>
+                  <a:schemeClr val="tx1"/>
+                </a:solidFill>
+              </a:rPr>
+              <a:t>re module </a:t>
+            </a:r>
+            <a:r>
+              <a:rPr lang="en-IN" sz="1200" dirty="0">
+                <a:solidFill>
+                  <a:srgbClr val="0070C0"/>
+                </a:solidFill>
+                <a:hlinkClick r:id="rId6">
+                  <a:extLst>
+                    <a:ext uri="{A12FA001-AC4F-418D-AE19-62706E023703}">
+                      <ahyp:hlinkClr xmlns:ahyp="http://schemas.microsoft.com/office/drawing/2018/hyperlinkcolor" val="tx"/>
+                    </a:ext>
+                  </a:extLst>
+                </a:hlinkClick>
+              </a:rPr>
+              <a:t>https://www.w3schools.com/python/python_regex.asp</a:t>
+            </a:r>
+            <a:r>
+              <a:rPr lang="en-IN" sz="1200" dirty="0">
+                <a:solidFill>
+                  <a:srgbClr val="0070C0"/>
+                </a:solidFill>
+              </a:rPr>
+              <a:t> </a:t>
+            </a:r>
+          </a:p>
+          <a:p>
+            <a:pPr marL="285750" indent="-285750" algn="l">
+              <a:buFont typeface="Arial" panose="020B0604020202020204" pitchFamily="34" charset="0"/>
+              <a:buChar char="•"/>
+            </a:pPr>
+            <a:r>
+              <a:rPr lang="en-IN" sz="1200" dirty="0">
+                <a:solidFill>
+                  <a:schemeClr val="tx1"/>
+                </a:solidFill>
+              </a:rPr>
+              <a:t>Regex applications </a:t>
+            </a:r>
+            <a:r>
+              <a:rPr lang="en-US" sz="1200" dirty="0">
+                <a:solidFill>
+                  <a:srgbClr val="0070C0"/>
+                </a:solidFill>
+                <a:hlinkClick r:id="rId7">
+                  <a:extLst>
+                    <a:ext uri="{A12FA001-AC4F-418D-AE19-62706E023703}">
+                      <ahyp:hlinkClr xmlns:ahyp="http://schemas.microsoft.com/office/drawing/2018/hyperlinkcolor" val="tx"/>
+                    </a:ext>
+                  </a:extLst>
+                </a:hlinkClick>
+              </a:rPr>
+              <a:t>Python - Substituting patterns in text using regex – </a:t>
+            </a:r>
+            <a:r>
+              <a:rPr lang="en-US" sz="1200" dirty="0" err="1">
+                <a:solidFill>
+                  <a:srgbClr val="0070C0"/>
+                </a:solidFill>
+                <a:hlinkClick r:id="rId7">
+                  <a:extLst>
+                    <a:ext uri="{A12FA001-AC4F-418D-AE19-62706E023703}">
+                      <ahyp:hlinkClr xmlns:ahyp="http://schemas.microsoft.com/office/drawing/2018/hyperlinkcolor" val="tx"/>
+                    </a:ext>
+                  </a:extLst>
+                </a:hlinkClick>
+              </a:rPr>
+              <a:t>GeeksforGeeks</a:t>
+            </a:r>
+            <a:endParaRPr lang="en-US" sz="1200" dirty="0">
+              <a:solidFill>
+                <a:srgbClr val="0070C0"/>
+              </a:solidFill>
+            </a:endParaRPr>
+          </a:p>
+          <a:p>
+            <a:pPr marL="285750" indent="-285750" algn="l">
+              <a:buFont typeface="Arial" panose="020B0604020202020204" pitchFamily="34" charset="0"/>
+              <a:buChar char="•"/>
+            </a:pPr>
+            <a:r>
+              <a:rPr lang="en-US" sz="1200" dirty="0">
+                <a:solidFill>
+                  <a:schemeClr val="tx1"/>
+                </a:solidFill>
+              </a:rPr>
+              <a:t>Print alphabets </a:t>
+            </a:r>
+            <a:r>
+              <a:rPr lang="en-US" sz="1200" dirty="0">
+                <a:solidFill>
+                  <a:srgbClr val="0070C0"/>
+                </a:solidFill>
+                <a:hlinkClick r:id="rId8">
+                  <a:extLst>
+                    <a:ext uri="{A12FA001-AC4F-418D-AE19-62706E023703}">
+                      <ahyp:hlinkClr xmlns:ahyp="http://schemas.microsoft.com/office/drawing/2018/hyperlinkcolor" val="tx"/>
+                    </a:ext>
+                  </a:extLst>
+                </a:hlinkClick>
+              </a:rPr>
+              <a:t>Python list of letters a-z - PythonProgramming.in</a:t>
+            </a:r>
+            <a:endParaRPr lang="en-US" sz="1200" dirty="0">
+              <a:solidFill>
+                <a:srgbClr val="0070C0"/>
+              </a:solidFill>
+            </a:endParaRPr>
+          </a:p>
+          <a:p>
+            <a:pPr marL="285750" indent="-285750" algn="l">
+              <a:buFont typeface="Arial" panose="020B0604020202020204" pitchFamily="34" charset="0"/>
+              <a:buChar char="•"/>
+            </a:pPr>
+            <a:r>
+              <a:rPr lang="en-US" sz="1200" dirty="0">
+                <a:solidFill>
+                  <a:schemeClr val="tx1"/>
+                </a:solidFill>
+              </a:rPr>
+              <a:t>Pandas convert date string to datetime </a:t>
+            </a:r>
+            <a:r>
+              <a:rPr lang="en-US" sz="1200" dirty="0">
+                <a:solidFill>
+                  <a:srgbClr val="0070C0"/>
+                </a:solidFill>
+                <a:hlinkClick r:id="rId9">
+                  <a:extLst>
+                    <a:ext uri="{A12FA001-AC4F-418D-AE19-62706E023703}">
+                      <ahyp:hlinkClr xmlns:ahyp="http://schemas.microsoft.com/office/drawing/2018/hyperlinkcolor" val="tx"/>
+                    </a:ext>
+                  </a:extLst>
+                </a:hlinkClick>
+              </a:rPr>
+              <a:t>Pandas Convert Column To </a:t>
+            </a:r>
+            <a:r>
+              <a:rPr lang="en-US" sz="1200" dirty="0" err="1">
+                <a:solidFill>
+                  <a:srgbClr val="0070C0"/>
+                </a:solidFill>
+                <a:hlinkClick r:id="rId9">
+                  <a:extLst>
+                    <a:ext uri="{A12FA001-AC4F-418D-AE19-62706E023703}">
+                      <ahyp:hlinkClr xmlns:ahyp="http://schemas.microsoft.com/office/drawing/2018/hyperlinkcolor" val="tx"/>
+                    </a:ext>
+                  </a:extLst>
+                </a:hlinkClick>
+              </a:rPr>
+              <a:t>DateTime</a:t>
+            </a:r>
+            <a:r>
+              <a:rPr lang="en-US" sz="1200" dirty="0">
+                <a:solidFill>
+                  <a:srgbClr val="0070C0"/>
+                </a:solidFill>
+                <a:hlinkClick r:id="rId9">
+                  <a:extLst>
+                    <a:ext uri="{A12FA001-AC4F-418D-AE19-62706E023703}">
+                      <ahyp:hlinkClr xmlns:ahyp="http://schemas.microsoft.com/office/drawing/2018/hyperlinkcolor" val="tx"/>
+                    </a:ext>
+                  </a:extLst>
+                </a:hlinkClick>
+              </a:rPr>
+              <a:t> - Spark by {Examples} (sparkbyexamples.com)</a:t>
+            </a:r>
+            <a:endParaRPr lang="en-IN" sz="1200" dirty="0">
+              <a:solidFill>
+                <a:srgbClr val="0070C0"/>
+              </a:solidFill>
+            </a:endParaRPr>
           </a:p>
         </p:txBody>
       </p:sp>
@@ -13305,10 +13648,7 @@
               <a:rPr lang="en-US" b="1" dirty="0"/>
               <a:t>() </a:t>
             </a:r>
-            <a:r>
-              <a:rPr lang="en-US" dirty="0"/>
-              <a:t>– 52 arguments</a:t>
-            </a:r>
+            <a:endParaRPr lang="en-US" dirty="0"/>
           </a:p>
           <a:p>
             <a:pPr lvl="2" indent="-285750" algn="l">
@@ -13344,7 +13684,7 @@
             </a:r>
             <a:r>
               <a:rPr lang="en-IN" dirty="0"/>
-              <a:t> method – 5 arguments and 439 methods</a:t>
+              <a:t> method</a:t>
             </a:r>
           </a:p>
           <a:p>
@@ -13378,10 +13718,7 @@
               <a:rPr lang="en-IN" dirty="0" err="1"/>
               <a:t>df.shape</a:t>
             </a:r>
-            <a:r>
-              <a:rPr lang="en-IN" dirty="0"/>
-              <a:t>()</a:t>
-            </a:r>
+            <a:endParaRPr lang="en-IN" dirty="0"/>
           </a:p>
           <a:p>
             <a:r>

</xml_diff>

<commit_message>
Data Science w/ Adv. Python docs-update2
</commit_message>
<xml_diff>
--- a/data-science-adv-python/Data Science w Advanced Python.pptx
+++ b/data-science-adv-python/Data Science w Advanced Python.pptx
@@ -6,13 +6,13 @@
     <p:sldMasterId id="2147483678" r:id="rId2"/>
   </p:sldMasterIdLst>
   <p:sldIdLst>
-    <p:sldId id="257" r:id="rId3"/>
-    <p:sldId id="258" r:id="rId4"/>
-    <p:sldId id="281" r:id="rId5"/>
-    <p:sldId id="259" r:id="rId6"/>
-    <p:sldId id="282" r:id="rId7"/>
-    <p:sldId id="261" r:id="rId8"/>
-    <p:sldId id="283" r:id="rId9"/>
+    <p:sldId id="290" r:id="rId3"/>
+    <p:sldId id="257" r:id="rId4"/>
+    <p:sldId id="258" r:id="rId5"/>
+    <p:sldId id="281" r:id="rId6"/>
+    <p:sldId id="259" r:id="rId7"/>
+    <p:sldId id="282" r:id="rId8"/>
+    <p:sldId id="261" r:id="rId9"/>
     <p:sldId id="284" r:id="rId10"/>
     <p:sldId id="287" r:id="rId11"/>
     <p:sldId id="285" r:id="rId12"/>
@@ -9220,7 +9220,7 @@
         </p:nvSpPr>
         <p:spPr>
           <a:xfrm>
-            <a:off x="1149258" y="1308242"/>
+            <a:off x="937223" y="3429000"/>
             <a:ext cx="7766936" cy="804052"/>
           </a:xfrm>
         </p:spPr>
@@ -9231,78 +9231,71 @@
             <a:pPr algn="l"/>
             <a:r>
               <a:rPr lang="en-US" dirty="0"/>
-              <a:t>Objectives</a:t>
+              <a:t>Data Science with</a:t>
+            </a:r>
+            <a:br>
+              <a:rPr lang="en-US" dirty="0"/>
+            </a:br>
+            <a:r>
+              <a:rPr lang="en-US" dirty="0"/>
+              <a:t>Advanced Python</a:t>
             </a:r>
             <a:endParaRPr lang="en-IN" dirty="0"/>
           </a:p>
         </p:txBody>
       </p:sp>
-      <p:sp>
-        <p:nvSpPr>
-          <p:cNvPr id="3" name="Subtitle 2">
+      <p:pic>
+        <p:nvPicPr>
+          <p:cNvPr id="5" name="Picture 4">
             <a:extLst>
               <a:ext uri="{FF2B5EF4-FFF2-40B4-BE49-F238E27FC236}">
-                <a16:creationId xmlns:a16="http://schemas.microsoft.com/office/drawing/2014/main" id="{63D1DC60-7707-3A2E-E4B9-B25C393D84C4}"/>
+                <a16:creationId xmlns:a16="http://schemas.microsoft.com/office/drawing/2014/main" id="{DD201ABC-9D24-E416-BB0D-92E94309B178}"/>
               </a:ext>
             </a:extLst>
           </p:cNvPr>
-          <p:cNvSpPr>
-            <a:spLocks noGrp="1"/>
-          </p:cNvSpPr>
-          <p:nvPr>
-            <p:ph type="subTitle" idx="1"/>
-          </p:nvPr>
-        </p:nvSpPr>
+          <p:cNvPicPr>
+            <a:picLocks noChangeAspect="1"/>
+          </p:cNvPicPr>
+          <p:nvPr/>
+        </p:nvPicPr>
+        <p:blipFill>
+          <a:blip r:embed="rId2"/>
+          <a:stretch>
+            <a:fillRect/>
+          </a:stretch>
+        </p:blipFill>
         <p:spPr>
           <a:xfrm>
-            <a:off x="1321537" y="2112294"/>
-            <a:ext cx="7766936" cy="1956123"/>
+            <a:off x="7108724" y="2736574"/>
+            <a:ext cx="1595435" cy="1384852"/>
           </a:xfrm>
+          <a:prstGeom prst="rect">
+            <a:avLst/>
+          </a:prstGeom>
         </p:spPr>
-        <p:txBody>
-          <a:bodyPr>
-            <a:normAutofit/>
-          </a:bodyPr>
-          <a:lstStyle/>
-          <a:p>
-            <a:pPr marL="285750" indent="-285750" algn="l">
-              <a:buFont typeface="Arial" panose="020B0604020202020204" pitchFamily="34" charset="0"/>
-              <a:buChar char="•"/>
-            </a:pPr>
-            <a:r>
-              <a:rPr lang="en-US" dirty="0"/>
-              <a:t>To present concepts like Data Science and Machine Learning in a simple, illustrative way</a:t>
-            </a:r>
-          </a:p>
-          <a:p>
-            <a:pPr marL="285750" indent="-285750" algn="l">
-              <a:buFont typeface="Arial" panose="020B0604020202020204" pitchFamily="34" charset="0"/>
-              <a:buChar char="•"/>
-            </a:pPr>
-            <a:r>
-              <a:rPr lang="en-US" dirty="0"/>
-              <a:t>To practically demonstrate associated topics like EDA, data manipulation and touch upon data pre-processing, model training, prediction with Python, using a simple case study</a:t>
-            </a:r>
-          </a:p>
-          <a:p>
-            <a:pPr marL="285750" indent="-285750" algn="l">
-              <a:buFont typeface="Arial" panose="020B0604020202020204" pitchFamily="34" charset="0"/>
-              <a:buChar char="•"/>
-            </a:pPr>
-            <a:endParaRPr lang="en-IN" dirty="0"/>
-          </a:p>
-        </p:txBody>
-      </p:sp>
+      </p:pic>
     </p:spTree>
     <p:extLst>
       <p:ext uri="{BB962C8B-B14F-4D97-AF65-F5344CB8AC3E}">
-        <p14:creationId xmlns:p14="http://schemas.microsoft.com/office/powerpoint/2010/main" val="3687445652"/>
+        <p14:creationId xmlns:p14="http://schemas.microsoft.com/office/powerpoint/2010/main" val="4233249415"/>
       </p:ext>
     </p:extLst>
   </p:cSld>
   <p:clrMapOvr>
     <a:masterClrMapping/>
   </p:clrMapOvr>
+  <mc:AlternateContent xmlns:mc="http://schemas.openxmlformats.org/markup-compatibility/2006">
+    <mc:Choice xmlns:p14="http://schemas.microsoft.com/office/powerpoint/2010/main" Requires="p14">
+      <p:transition spd="med" p14:dur="700">
+        <p:fade/>
+      </p:transition>
+    </mc:Choice>
+    <mc:Fallback>
+      <p:transition spd="med">
+        <p:fade/>
+      </p:transition>
+    </mc:Fallback>
+  </mc:AlternateContent>
 </p:sld>
 </file>
 
@@ -9552,6 +9545,36 @@
           </a:p>
         </p:txBody>
       </p:sp>
+      <p:pic>
+        <p:nvPicPr>
+          <p:cNvPr id="4" name="Picture 3">
+            <a:extLst>
+              <a:ext uri="{FF2B5EF4-FFF2-40B4-BE49-F238E27FC236}">
+                <a16:creationId xmlns:a16="http://schemas.microsoft.com/office/drawing/2014/main" id="{70AE4C0B-5501-8902-4A47-DCF5B89C11E1}"/>
+              </a:ext>
+            </a:extLst>
+          </p:cNvPr>
+          <p:cNvPicPr>
+            <a:picLocks noChangeAspect="1"/>
+          </p:cNvPicPr>
+          <p:nvPr/>
+        </p:nvPicPr>
+        <p:blipFill>
+          <a:blip r:embed="rId2"/>
+          <a:stretch>
+            <a:fillRect/>
+          </a:stretch>
+        </p:blipFill>
+        <p:spPr>
+          <a:xfrm>
+            <a:off x="10447178" y="5473148"/>
+            <a:ext cx="1595435" cy="1384852"/>
+          </a:xfrm>
+          <a:prstGeom prst="rect">
+            <a:avLst/>
+          </a:prstGeom>
+        </p:spPr>
+      </p:pic>
     </p:spTree>
     <p:extLst>
       <p:ext uri="{BB962C8B-B14F-4D97-AF65-F5344CB8AC3E}">
@@ -9562,6 +9585,18 @@
   <p:clrMapOvr>
     <a:masterClrMapping/>
   </p:clrMapOvr>
+  <mc:AlternateContent xmlns:mc="http://schemas.openxmlformats.org/markup-compatibility/2006">
+    <mc:Choice xmlns:p14="http://schemas.microsoft.com/office/powerpoint/2010/main" Requires="p14">
+      <p:transition spd="med" p14:dur="700">
+        <p:fade/>
+      </p:transition>
+    </mc:Choice>
+    <mc:Fallback>
+      <p:transition spd="med">
+        <p:fade/>
+      </p:transition>
+    </mc:Fallback>
+  </mc:AlternateContent>
 </p:sld>
 </file>
 
@@ -9752,6 +9787,36 @@
           </a:p>
         </p:txBody>
       </p:sp>
+      <p:pic>
+        <p:nvPicPr>
+          <p:cNvPr id="4" name="Picture 3">
+            <a:extLst>
+              <a:ext uri="{FF2B5EF4-FFF2-40B4-BE49-F238E27FC236}">
+                <a16:creationId xmlns:a16="http://schemas.microsoft.com/office/drawing/2014/main" id="{420CF19D-3776-47DD-B265-D4EDEA3AF229}"/>
+              </a:ext>
+            </a:extLst>
+          </p:cNvPr>
+          <p:cNvPicPr>
+            <a:picLocks noChangeAspect="1"/>
+          </p:cNvPicPr>
+          <p:nvPr/>
+        </p:nvPicPr>
+        <p:blipFill>
+          <a:blip r:embed="rId2"/>
+          <a:stretch>
+            <a:fillRect/>
+          </a:stretch>
+        </p:blipFill>
+        <p:spPr>
+          <a:xfrm>
+            <a:off x="10447178" y="5473148"/>
+            <a:ext cx="1595435" cy="1384852"/>
+          </a:xfrm>
+          <a:prstGeom prst="rect">
+            <a:avLst/>
+          </a:prstGeom>
+        </p:spPr>
+      </p:pic>
     </p:spTree>
     <p:extLst>
       <p:ext uri="{BB962C8B-B14F-4D97-AF65-F5344CB8AC3E}">
@@ -9762,6 +9827,18 @@
   <p:clrMapOvr>
     <a:masterClrMapping/>
   </p:clrMapOvr>
+  <mc:AlternateContent xmlns:mc="http://schemas.openxmlformats.org/markup-compatibility/2006">
+    <mc:Choice xmlns:p14="http://schemas.microsoft.com/office/powerpoint/2010/main" Requires="p14">
+      <p:transition spd="med" p14:dur="700">
+        <p:fade/>
+      </p:transition>
+    </mc:Choice>
+    <mc:Fallback>
+      <p:transition spd="med">
+        <p:fade/>
+      </p:transition>
+    </mc:Fallback>
+  </mc:AlternateContent>
 </p:sld>
 </file>
 
@@ -9800,7 +9877,7 @@
         </p:nvSpPr>
         <p:spPr>
           <a:xfrm>
-            <a:off x="1986106" y="2998528"/>
+            <a:off x="1734314" y="4045450"/>
             <a:ext cx="8219787" cy="860943"/>
           </a:xfrm>
         </p:spPr>
@@ -9817,6 +9894,36 @@
           </a:p>
         </p:txBody>
       </p:sp>
+      <p:pic>
+        <p:nvPicPr>
+          <p:cNvPr id="2" name="Picture 1">
+            <a:extLst>
+              <a:ext uri="{FF2B5EF4-FFF2-40B4-BE49-F238E27FC236}">
+                <a16:creationId xmlns:a16="http://schemas.microsoft.com/office/drawing/2014/main" id="{B680917E-7EDC-7A22-19AF-6D11CA10B0F6}"/>
+              </a:ext>
+            </a:extLst>
+          </p:cNvPr>
+          <p:cNvPicPr>
+            <a:picLocks noChangeAspect="1"/>
+          </p:cNvPicPr>
+          <p:nvPr/>
+        </p:nvPicPr>
+        <p:blipFill>
+          <a:blip r:embed="rId2"/>
+          <a:stretch>
+            <a:fillRect/>
+          </a:stretch>
+        </p:blipFill>
+        <p:spPr>
+          <a:xfrm>
+            <a:off x="4267199" y="1480280"/>
+            <a:ext cx="2955235" cy="2565170"/>
+          </a:xfrm>
+          <a:prstGeom prst="rect">
+            <a:avLst/>
+          </a:prstGeom>
+        </p:spPr>
+      </p:pic>
     </p:spTree>
     <p:extLst>
       <p:ext uri="{BB962C8B-B14F-4D97-AF65-F5344CB8AC3E}">
@@ -9827,6 +9934,18 @@
   <p:clrMapOvr>
     <a:masterClrMapping/>
   </p:clrMapOvr>
+  <mc:AlternateContent xmlns:mc="http://schemas.openxmlformats.org/markup-compatibility/2006">
+    <mc:Choice xmlns:p14="http://schemas.microsoft.com/office/powerpoint/2010/main" Requires="p14">
+      <p:transition spd="med" p14:dur="700">
+        <p:fade/>
+      </p:transition>
+    </mc:Choice>
+    <mc:Fallback>
+      <p:transition spd="med">
+        <p:fade/>
+      </p:transition>
+    </mc:Fallback>
+  </mc:AlternateContent>
 </p:sld>
 </file>
 
@@ -10291,6 +10410,36 @@
           </a:p>
         </p:txBody>
       </p:sp>
+      <p:pic>
+        <p:nvPicPr>
+          <p:cNvPr id="4" name="Picture 3">
+            <a:extLst>
+              <a:ext uri="{FF2B5EF4-FFF2-40B4-BE49-F238E27FC236}">
+                <a16:creationId xmlns:a16="http://schemas.microsoft.com/office/drawing/2014/main" id="{D3841043-00FA-235A-53C4-1DF80634A152}"/>
+              </a:ext>
+            </a:extLst>
+          </p:cNvPr>
+          <p:cNvPicPr>
+            <a:picLocks noChangeAspect="1"/>
+          </p:cNvPicPr>
+          <p:nvPr/>
+        </p:nvPicPr>
+        <p:blipFill>
+          <a:blip r:embed="rId10"/>
+          <a:stretch>
+            <a:fillRect/>
+          </a:stretch>
+        </p:blipFill>
+        <p:spPr>
+          <a:xfrm>
+            <a:off x="10447178" y="5473148"/>
+            <a:ext cx="1595435" cy="1384852"/>
+          </a:xfrm>
+          <a:prstGeom prst="rect">
+            <a:avLst/>
+          </a:prstGeom>
+        </p:spPr>
+      </p:pic>
     </p:spTree>
     <p:extLst>
       <p:ext uri="{BB962C8B-B14F-4D97-AF65-F5344CB8AC3E}">
@@ -10301,10 +10450,185 @@
   <p:clrMapOvr>
     <a:masterClrMapping/>
   </p:clrMapOvr>
+  <mc:AlternateContent xmlns:mc="http://schemas.openxmlformats.org/markup-compatibility/2006">
+    <mc:Choice xmlns:p14="http://schemas.microsoft.com/office/powerpoint/2010/main" Requires="p14">
+      <p:transition spd="med" p14:dur="700">
+        <p:fade/>
+      </p:transition>
+    </mc:Choice>
+    <mc:Fallback>
+      <p:transition spd="med">
+        <p:fade/>
+      </p:transition>
+    </mc:Fallback>
+  </mc:AlternateContent>
 </p:sld>
 </file>
 
 <file path=ppt/slides/slide2.xml><?xml version="1.0" encoding="utf-8"?>
+<p:sld xmlns:a="http://schemas.openxmlformats.org/drawingml/2006/main" xmlns:r="http://schemas.openxmlformats.org/officeDocument/2006/relationships" xmlns:p="http://schemas.openxmlformats.org/presentationml/2006/main">
+  <p:cSld>
+    <p:spTree>
+      <p:nvGrpSpPr>
+        <p:cNvPr id="1" name=""/>
+        <p:cNvGrpSpPr/>
+        <p:nvPr/>
+      </p:nvGrpSpPr>
+      <p:grpSpPr>
+        <a:xfrm>
+          <a:off x="0" y="0"/>
+          <a:ext cx="0" cy="0"/>
+          <a:chOff x="0" y="0"/>
+          <a:chExt cx="0" cy="0"/>
+        </a:xfrm>
+      </p:grpSpPr>
+      <p:sp>
+        <p:nvSpPr>
+          <p:cNvPr id="2" name="Title 1">
+            <a:extLst>
+              <a:ext uri="{FF2B5EF4-FFF2-40B4-BE49-F238E27FC236}">
+                <a16:creationId xmlns:a16="http://schemas.microsoft.com/office/drawing/2014/main" id="{CB575C36-43B9-48EB-B0A8-E63053A094DA}"/>
+              </a:ext>
+            </a:extLst>
+          </p:cNvPr>
+          <p:cNvSpPr>
+            <a:spLocks noGrp="1"/>
+          </p:cNvSpPr>
+          <p:nvPr>
+            <p:ph type="ctrTitle"/>
+          </p:nvPr>
+        </p:nvSpPr>
+        <p:spPr>
+          <a:xfrm>
+            <a:off x="1149258" y="1308242"/>
+            <a:ext cx="7766936" cy="804052"/>
+          </a:xfrm>
+        </p:spPr>
+        <p:txBody>
+          <a:bodyPr/>
+          <a:lstStyle/>
+          <a:p>
+            <a:pPr algn="l"/>
+            <a:r>
+              <a:rPr lang="en-US" dirty="0"/>
+              <a:t>Objectives</a:t>
+            </a:r>
+            <a:endParaRPr lang="en-IN" dirty="0"/>
+          </a:p>
+        </p:txBody>
+      </p:sp>
+      <p:sp>
+        <p:nvSpPr>
+          <p:cNvPr id="3" name="Subtitle 2">
+            <a:extLst>
+              <a:ext uri="{FF2B5EF4-FFF2-40B4-BE49-F238E27FC236}">
+                <a16:creationId xmlns:a16="http://schemas.microsoft.com/office/drawing/2014/main" id="{63D1DC60-7707-3A2E-E4B9-B25C393D84C4}"/>
+              </a:ext>
+            </a:extLst>
+          </p:cNvPr>
+          <p:cNvSpPr>
+            <a:spLocks noGrp="1"/>
+          </p:cNvSpPr>
+          <p:nvPr>
+            <p:ph type="subTitle" idx="1"/>
+          </p:nvPr>
+        </p:nvSpPr>
+        <p:spPr>
+          <a:xfrm>
+            <a:off x="1321537" y="2112294"/>
+            <a:ext cx="7766936" cy="1956123"/>
+          </a:xfrm>
+        </p:spPr>
+        <p:txBody>
+          <a:bodyPr>
+            <a:normAutofit/>
+          </a:bodyPr>
+          <a:lstStyle/>
+          <a:p>
+            <a:pPr marL="285750" indent="-285750" algn="l">
+              <a:buFont typeface="Arial" panose="020B0604020202020204" pitchFamily="34" charset="0"/>
+              <a:buChar char="•"/>
+            </a:pPr>
+            <a:r>
+              <a:rPr lang="en-US" dirty="0"/>
+              <a:t>To present concepts like Data Science and Machine Learning in a simple, illustrative way</a:t>
+            </a:r>
+          </a:p>
+          <a:p>
+            <a:pPr marL="285750" indent="-285750" algn="l">
+              <a:buFont typeface="Arial" panose="020B0604020202020204" pitchFamily="34" charset="0"/>
+              <a:buChar char="•"/>
+            </a:pPr>
+            <a:r>
+              <a:rPr lang="en-US" dirty="0"/>
+              <a:t>To practically demonstrate associated topics like EDA, data manipulation and touch upon data pre-processing, model training, prediction with Python, using a simple case study</a:t>
+            </a:r>
+          </a:p>
+          <a:p>
+            <a:pPr marL="285750" indent="-285750" algn="l">
+              <a:buFont typeface="Arial" panose="020B0604020202020204" pitchFamily="34" charset="0"/>
+              <a:buChar char="•"/>
+            </a:pPr>
+            <a:endParaRPr lang="en-IN" dirty="0"/>
+          </a:p>
+        </p:txBody>
+      </p:sp>
+      <p:pic>
+        <p:nvPicPr>
+          <p:cNvPr id="5" name="Picture 4">
+            <a:extLst>
+              <a:ext uri="{FF2B5EF4-FFF2-40B4-BE49-F238E27FC236}">
+                <a16:creationId xmlns:a16="http://schemas.microsoft.com/office/drawing/2014/main" id="{DD201ABC-9D24-E416-BB0D-92E94309B178}"/>
+              </a:ext>
+            </a:extLst>
+          </p:cNvPr>
+          <p:cNvPicPr>
+            <a:picLocks noChangeAspect="1"/>
+          </p:cNvPicPr>
+          <p:nvPr/>
+        </p:nvPicPr>
+        <p:blipFill>
+          <a:blip r:embed="rId2"/>
+          <a:stretch>
+            <a:fillRect/>
+          </a:stretch>
+        </p:blipFill>
+        <p:spPr>
+          <a:xfrm>
+            <a:off x="10447178" y="5473148"/>
+            <a:ext cx="1595435" cy="1384852"/>
+          </a:xfrm>
+          <a:prstGeom prst="rect">
+            <a:avLst/>
+          </a:prstGeom>
+        </p:spPr>
+      </p:pic>
+    </p:spTree>
+    <p:extLst>
+      <p:ext uri="{BB962C8B-B14F-4D97-AF65-F5344CB8AC3E}">
+        <p14:creationId xmlns:p14="http://schemas.microsoft.com/office/powerpoint/2010/main" val="3687445652"/>
+      </p:ext>
+    </p:extLst>
+  </p:cSld>
+  <p:clrMapOvr>
+    <a:masterClrMapping/>
+  </p:clrMapOvr>
+  <mc:AlternateContent xmlns:mc="http://schemas.openxmlformats.org/markup-compatibility/2006">
+    <mc:Choice xmlns:p14="http://schemas.microsoft.com/office/powerpoint/2010/main" Requires="p14">
+      <p:transition spd="med" p14:dur="700">
+        <p:fade/>
+      </p:transition>
+    </mc:Choice>
+    <mc:Fallback>
+      <p:transition spd="med">
+        <p:fade/>
+      </p:transition>
+    </mc:Fallback>
+  </mc:AlternateContent>
+</p:sld>
+</file>
+
+<file path=ppt/slides/slide3.xml><?xml version="1.0" encoding="utf-8"?>
 <p:sld xmlns:a="http://schemas.openxmlformats.org/drawingml/2006/main" xmlns:r="http://schemas.openxmlformats.org/officeDocument/2006/relationships" xmlns:p="http://schemas.openxmlformats.org/presentationml/2006/main">
   <p:cSld>
     <p:spTree>
@@ -10699,6 +11023,36 @@
           </a:p>
         </p:txBody>
       </p:sp>
+      <p:pic>
+        <p:nvPicPr>
+          <p:cNvPr id="2" name="Picture 1">
+            <a:extLst>
+              <a:ext uri="{FF2B5EF4-FFF2-40B4-BE49-F238E27FC236}">
+                <a16:creationId xmlns:a16="http://schemas.microsoft.com/office/drawing/2014/main" id="{3A05EDA9-CC4E-DE74-1DB9-96D784DCF42D}"/>
+              </a:ext>
+            </a:extLst>
+          </p:cNvPr>
+          <p:cNvPicPr>
+            <a:picLocks noChangeAspect="1"/>
+          </p:cNvPicPr>
+          <p:nvPr/>
+        </p:nvPicPr>
+        <p:blipFill>
+          <a:blip r:embed="rId2"/>
+          <a:stretch>
+            <a:fillRect/>
+          </a:stretch>
+        </p:blipFill>
+        <p:spPr>
+          <a:xfrm>
+            <a:off x="10447178" y="5473148"/>
+            <a:ext cx="1595435" cy="1384852"/>
+          </a:xfrm>
+          <a:prstGeom prst="rect">
+            <a:avLst/>
+          </a:prstGeom>
+        </p:spPr>
+      </p:pic>
     </p:spTree>
     <p:extLst>
       <p:ext uri="{BB962C8B-B14F-4D97-AF65-F5344CB8AC3E}">
@@ -10709,10 +11063,22 @@
   <p:clrMapOvr>
     <a:masterClrMapping/>
   </p:clrMapOvr>
+  <mc:AlternateContent xmlns:mc="http://schemas.openxmlformats.org/markup-compatibility/2006">
+    <mc:Choice xmlns:p14="http://schemas.microsoft.com/office/powerpoint/2010/main" Requires="p14">
+      <p:transition spd="med" p14:dur="700">
+        <p:fade/>
+      </p:transition>
+    </mc:Choice>
+    <mc:Fallback>
+      <p:transition spd="med">
+        <p:fade/>
+      </p:transition>
+    </mc:Fallback>
+  </mc:AlternateContent>
 </p:sld>
 </file>
 
-<file path=ppt/slides/slide3.xml><?xml version="1.0" encoding="utf-8"?>
+<file path=ppt/slides/slide4.xml><?xml version="1.0" encoding="utf-8"?>
 <p:sld xmlns:a="http://schemas.openxmlformats.org/drawingml/2006/main" xmlns:r="http://schemas.openxmlformats.org/officeDocument/2006/relationships" xmlns:p="http://schemas.openxmlformats.org/presentationml/2006/main">
   <p:cSld>
     <p:spTree>
@@ -11482,6 +11848,36 @@
           </a:p>
         </p:txBody>
       </p:sp>
+      <p:pic>
+        <p:nvPicPr>
+          <p:cNvPr id="18" name="Picture 17">
+            <a:extLst>
+              <a:ext uri="{FF2B5EF4-FFF2-40B4-BE49-F238E27FC236}">
+                <a16:creationId xmlns:a16="http://schemas.microsoft.com/office/drawing/2014/main" id="{DCD3C958-2C32-79D4-067E-1E520441F5DC}"/>
+              </a:ext>
+            </a:extLst>
+          </p:cNvPr>
+          <p:cNvPicPr>
+            <a:picLocks noChangeAspect="1"/>
+          </p:cNvPicPr>
+          <p:nvPr/>
+        </p:nvPicPr>
+        <p:blipFill>
+          <a:blip r:embed="rId2"/>
+          <a:stretch>
+            <a:fillRect/>
+          </a:stretch>
+        </p:blipFill>
+        <p:spPr>
+          <a:xfrm>
+            <a:off x="10447178" y="5473148"/>
+            <a:ext cx="1595435" cy="1384852"/>
+          </a:xfrm>
+          <a:prstGeom prst="rect">
+            <a:avLst/>
+          </a:prstGeom>
+        </p:spPr>
+      </p:pic>
     </p:spTree>
     <p:extLst>
       <p:ext uri="{BB962C8B-B14F-4D97-AF65-F5344CB8AC3E}">
@@ -11492,6 +11888,18 @@
   <p:clrMapOvr>
     <a:masterClrMapping/>
   </p:clrMapOvr>
+  <mc:AlternateContent xmlns:mc="http://schemas.openxmlformats.org/markup-compatibility/2006">
+    <mc:Choice xmlns:p14="http://schemas.microsoft.com/office/powerpoint/2010/main" Requires="p14">
+      <p:transition spd="med" p14:dur="700">
+        <p:fade/>
+      </p:transition>
+    </mc:Choice>
+    <mc:Fallback>
+      <p:transition spd="med">
+        <p:fade/>
+      </p:transition>
+    </mc:Fallback>
+  </mc:AlternateContent>
   <p:timing>
     <p:tnLst>
       <p:par>
@@ -12157,7 +12565,7 @@
 </p:sld>
 </file>
 
-<file path=ppt/slides/slide4.xml><?xml version="1.0" encoding="utf-8"?>
+<file path=ppt/slides/slide5.xml><?xml version="1.0" encoding="utf-8"?>
 <p:sld xmlns:a="http://schemas.openxmlformats.org/drawingml/2006/main" xmlns:r="http://schemas.openxmlformats.org/officeDocument/2006/relationships" xmlns:p="http://schemas.openxmlformats.org/presentationml/2006/main">
   <p:cSld>
     <p:spTree>
@@ -12450,6 +12858,36 @@
           </p:spPr>
         </p:pic>
       </p:grpSp>
+      <p:pic>
+        <p:nvPicPr>
+          <p:cNvPr id="6" name="Picture 5">
+            <a:extLst>
+              <a:ext uri="{FF2B5EF4-FFF2-40B4-BE49-F238E27FC236}">
+                <a16:creationId xmlns:a16="http://schemas.microsoft.com/office/drawing/2014/main" id="{AB1B782A-AE02-C7AE-FE60-353B8ADB623C}"/>
+              </a:ext>
+            </a:extLst>
+          </p:cNvPr>
+          <p:cNvPicPr>
+            <a:picLocks noChangeAspect="1"/>
+          </p:cNvPicPr>
+          <p:nvPr/>
+        </p:nvPicPr>
+        <p:blipFill>
+          <a:blip r:embed="rId4"/>
+          <a:stretch>
+            <a:fillRect/>
+          </a:stretch>
+        </p:blipFill>
+        <p:spPr>
+          <a:xfrm>
+            <a:off x="10447178" y="5473148"/>
+            <a:ext cx="1595435" cy="1384852"/>
+          </a:xfrm>
+          <a:prstGeom prst="rect">
+            <a:avLst/>
+          </a:prstGeom>
+        </p:spPr>
+      </p:pic>
     </p:spTree>
     <p:extLst>
       <p:ext uri="{BB962C8B-B14F-4D97-AF65-F5344CB8AC3E}">
@@ -12460,6 +12898,18 @@
   <p:clrMapOvr>
     <a:masterClrMapping/>
   </p:clrMapOvr>
+  <mc:AlternateContent xmlns:mc="http://schemas.openxmlformats.org/markup-compatibility/2006">
+    <mc:Choice xmlns:p14="http://schemas.microsoft.com/office/powerpoint/2010/main" Requires="p14">
+      <p:transition spd="med" p14:dur="700">
+        <p:fade/>
+      </p:transition>
+    </mc:Choice>
+    <mc:Fallback>
+      <p:transition spd="med">
+        <p:fade/>
+      </p:transition>
+    </mc:Fallback>
+  </mc:AlternateContent>
   <p:timing>
     <p:tnLst>
       <p:par>
@@ -12599,7 +13049,7 @@
 </p:sld>
 </file>
 
-<file path=ppt/slides/slide5.xml><?xml version="1.0" encoding="utf-8"?>
+<file path=ppt/slides/slide6.xml><?xml version="1.0" encoding="utf-8"?>
 <p:sld xmlns:a="http://schemas.openxmlformats.org/drawingml/2006/main" xmlns:r="http://schemas.openxmlformats.org/officeDocument/2006/relationships" xmlns:p="http://schemas.openxmlformats.org/presentationml/2006/main">
   <p:cSld>
     <p:spTree>
@@ -12698,6 +13148,36 @@
           </a:extLst>
         </p:spPr>
       </p:pic>
+      <p:pic>
+        <p:nvPicPr>
+          <p:cNvPr id="3" name="Picture 2">
+            <a:extLst>
+              <a:ext uri="{FF2B5EF4-FFF2-40B4-BE49-F238E27FC236}">
+                <a16:creationId xmlns:a16="http://schemas.microsoft.com/office/drawing/2014/main" id="{8E4FDCD3-03AF-1C3C-6205-C7929E920C21}"/>
+              </a:ext>
+            </a:extLst>
+          </p:cNvPr>
+          <p:cNvPicPr>
+            <a:picLocks noChangeAspect="1"/>
+          </p:cNvPicPr>
+          <p:nvPr/>
+        </p:nvPicPr>
+        <p:blipFill>
+          <a:blip r:embed="rId3"/>
+          <a:stretch>
+            <a:fillRect/>
+          </a:stretch>
+        </p:blipFill>
+        <p:spPr>
+          <a:xfrm>
+            <a:off x="10447178" y="5473148"/>
+            <a:ext cx="1595435" cy="1384852"/>
+          </a:xfrm>
+          <a:prstGeom prst="rect">
+            <a:avLst/>
+          </a:prstGeom>
+        </p:spPr>
+      </p:pic>
     </p:spTree>
     <p:extLst>
       <p:ext uri="{BB962C8B-B14F-4D97-AF65-F5344CB8AC3E}">
@@ -12708,6 +13188,18 @@
   <p:clrMapOvr>
     <a:masterClrMapping/>
   </p:clrMapOvr>
+  <mc:AlternateContent xmlns:mc="http://schemas.openxmlformats.org/markup-compatibility/2006">
+    <mc:Choice xmlns:p14="http://schemas.microsoft.com/office/powerpoint/2010/main" Requires="p14">
+      <p:transition spd="med" p14:dur="700">
+        <p:fade/>
+      </p:transition>
+    </mc:Choice>
+    <mc:Fallback>
+      <p:transition spd="med">
+        <p:fade/>
+      </p:transition>
+    </mc:Fallback>
+  </mc:AlternateContent>
   <p:timing>
     <p:tnLst>
       <p:par>
@@ -12794,7 +13286,7 @@
 </p:sld>
 </file>
 
-<file path=ppt/slides/slide6.xml><?xml version="1.0" encoding="utf-8"?>
+<file path=ppt/slides/slide7.xml><?xml version="1.0" encoding="utf-8"?>
 <p:sld xmlns:a="http://schemas.openxmlformats.org/drawingml/2006/main" xmlns:r="http://schemas.openxmlformats.org/officeDocument/2006/relationships" xmlns:p="http://schemas.openxmlformats.org/presentationml/2006/main">
   <p:cSld>
     <p:spTree>
@@ -13083,6 +13575,36 @@
           </p:txBody>
         </p:sp>
       </p:grpSp>
+      <p:pic>
+        <p:nvPicPr>
+          <p:cNvPr id="4" name="Picture 3">
+            <a:extLst>
+              <a:ext uri="{FF2B5EF4-FFF2-40B4-BE49-F238E27FC236}">
+                <a16:creationId xmlns:a16="http://schemas.microsoft.com/office/drawing/2014/main" id="{BEDB7D28-BC3B-DDBE-5697-E92D7C21DF93}"/>
+              </a:ext>
+            </a:extLst>
+          </p:cNvPr>
+          <p:cNvPicPr>
+            <a:picLocks noChangeAspect="1"/>
+          </p:cNvPicPr>
+          <p:nvPr/>
+        </p:nvPicPr>
+        <p:blipFill>
+          <a:blip r:embed="rId4"/>
+          <a:stretch>
+            <a:fillRect/>
+          </a:stretch>
+        </p:blipFill>
+        <p:spPr>
+          <a:xfrm>
+            <a:off x="10447178" y="5473148"/>
+            <a:ext cx="1595435" cy="1384852"/>
+          </a:xfrm>
+          <a:prstGeom prst="rect">
+            <a:avLst/>
+          </a:prstGeom>
+        </p:spPr>
+      </p:pic>
     </p:spTree>
     <p:extLst>
       <p:ext uri="{BB962C8B-B14F-4D97-AF65-F5344CB8AC3E}">
@@ -13093,6 +13615,18 @@
   <p:clrMapOvr>
     <a:masterClrMapping/>
   </p:clrMapOvr>
+  <mc:AlternateContent xmlns:mc="http://schemas.openxmlformats.org/markup-compatibility/2006">
+    <mc:Choice xmlns:p14="http://schemas.microsoft.com/office/powerpoint/2010/main" Requires="p14">
+      <p:transition spd="med" p14:dur="700">
+        <p:fade/>
+      </p:transition>
+    </mc:Choice>
+    <mc:Fallback>
+      <p:transition spd="med">
+        <p:fade/>
+      </p:transition>
+    </mc:Fallback>
+  </mc:AlternateContent>
   <p:timing>
     <p:tnLst>
       <p:par>
@@ -13232,115 +13766,6 @@
 </p:sld>
 </file>
 
-<file path=ppt/slides/slide7.xml><?xml version="1.0" encoding="utf-8"?>
-<p:sld xmlns:a="http://schemas.openxmlformats.org/drawingml/2006/main" xmlns:r="http://schemas.openxmlformats.org/officeDocument/2006/relationships" xmlns:p="http://schemas.openxmlformats.org/presentationml/2006/main">
-  <p:cSld>
-    <p:spTree>
-      <p:nvGrpSpPr>
-        <p:cNvPr id="1" name=""/>
-        <p:cNvGrpSpPr/>
-        <p:nvPr/>
-      </p:nvGrpSpPr>
-      <p:grpSpPr>
-        <a:xfrm>
-          <a:off x="0" y="0"/>
-          <a:ext cx="0" cy="0"/>
-          <a:chOff x="0" y="0"/>
-          <a:chExt cx="0" cy="0"/>
-        </a:xfrm>
-      </p:grpSpPr>
-      <p:sp>
-        <p:nvSpPr>
-          <p:cNvPr id="2" name="Title 1">
-            <a:extLst>
-              <a:ext uri="{FF2B5EF4-FFF2-40B4-BE49-F238E27FC236}">
-                <a16:creationId xmlns:a16="http://schemas.microsoft.com/office/drawing/2014/main" id="{CB575C36-43B9-48EB-B0A8-E63053A094DA}"/>
-              </a:ext>
-            </a:extLst>
-          </p:cNvPr>
-          <p:cNvSpPr>
-            <a:spLocks noGrp="1"/>
-          </p:cNvSpPr>
-          <p:nvPr>
-            <p:ph type="ctrTitle"/>
-          </p:nvPr>
-        </p:nvSpPr>
-        <p:spPr>
-          <a:xfrm>
-            <a:off x="1149258" y="1308242"/>
-            <a:ext cx="7766936" cy="804052"/>
-          </a:xfrm>
-        </p:spPr>
-        <p:txBody>
-          <a:bodyPr/>
-          <a:lstStyle/>
-          <a:p>
-            <a:pPr algn="l"/>
-            <a:r>
-              <a:rPr lang="en-US" dirty="0"/>
-              <a:t>Data manipulation</a:t>
-            </a:r>
-            <a:endParaRPr lang="en-IN" dirty="0"/>
-          </a:p>
-        </p:txBody>
-      </p:sp>
-      <p:sp>
-        <p:nvSpPr>
-          <p:cNvPr id="3" name="Subtitle 2">
-            <a:extLst>
-              <a:ext uri="{FF2B5EF4-FFF2-40B4-BE49-F238E27FC236}">
-                <a16:creationId xmlns:a16="http://schemas.microsoft.com/office/drawing/2014/main" id="{63D1DC60-7707-3A2E-E4B9-B25C393D84C4}"/>
-              </a:ext>
-            </a:extLst>
-          </p:cNvPr>
-          <p:cNvSpPr>
-            <a:spLocks noGrp="1"/>
-          </p:cNvSpPr>
-          <p:nvPr>
-            <p:ph type="subTitle" idx="1"/>
-          </p:nvPr>
-        </p:nvSpPr>
-        <p:spPr>
-          <a:xfrm>
-            <a:off x="1321537" y="2112294"/>
-            <a:ext cx="7766936" cy="1096899"/>
-          </a:xfrm>
-        </p:spPr>
-        <p:txBody>
-          <a:bodyPr/>
-          <a:lstStyle/>
-          <a:p>
-            <a:pPr marL="285750" indent="-285750" algn="l">
-              <a:buFont typeface="Arial" panose="020B0604020202020204" pitchFamily="34" charset="0"/>
-              <a:buChar char="•"/>
-            </a:pPr>
-            <a:r>
-              <a:rPr lang="en-US" dirty="0"/>
-              <a:t>To present concepts like Data Science and Machine Learning in a simple, illustrative way</a:t>
-            </a:r>
-          </a:p>
-          <a:p>
-            <a:pPr marL="285750" indent="-285750" algn="l">
-              <a:buFont typeface="Arial" panose="020B0604020202020204" pitchFamily="34" charset="0"/>
-              <a:buChar char="•"/>
-            </a:pPr>
-            <a:endParaRPr lang="en-IN" dirty="0"/>
-          </a:p>
-        </p:txBody>
-      </p:sp>
-    </p:spTree>
-    <p:extLst>
-      <p:ext uri="{BB962C8B-B14F-4D97-AF65-F5344CB8AC3E}">
-        <p14:creationId xmlns:p14="http://schemas.microsoft.com/office/powerpoint/2010/main" val="670333859"/>
-      </p:ext>
-    </p:extLst>
-  </p:cSld>
-  <p:clrMapOvr>
-    <a:masterClrMapping/>
-  </p:clrMapOvr>
-</p:sld>
-</file>
-
 <file path=ppt/slides/slide8.xml><?xml version="1.0" encoding="utf-8"?>
 <p:sld xmlns:a="http://schemas.openxmlformats.org/drawingml/2006/main" xmlns:r="http://schemas.openxmlformats.org/officeDocument/2006/relationships" xmlns:p="http://schemas.openxmlformats.org/presentationml/2006/main">
   <p:cSld>
@@ -13537,6 +13962,36 @@
           </a:p>
         </p:txBody>
       </p:sp>
+      <p:pic>
+        <p:nvPicPr>
+          <p:cNvPr id="4" name="Picture 3">
+            <a:extLst>
+              <a:ext uri="{FF2B5EF4-FFF2-40B4-BE49-F238E27FC236}">
+                <a16:creationId xmlns:a16="http://schemas.microsoft.com/office/drawing/2014/main" id="{7AB85184-B767-9AC2-B04E-DD0C1F251F9C}"/>
+              </a:ext>
+            </a:extLst>
+          </p:cNvPr>
+          <p:cNvPicPr>
+            <a:picLocks noChangeAspect="1"/>
+          </p:cNvPicPr>
+          <p:nvPr/>
+        </p:nvPicPr>
+        <p:blipFill>
+          <a:blip r:embed="rId2"/>
+          <a:stretch>
+            <a:fillRect/>
+          </a:stretch>
+        </p:blipFill>
+        <p:spPr>
+          <a:xfrm>
+            <a:off x="10447178" y="5473148"/>
+            <a:ext cx="1595435" cy="1384852"/>
+          </a:xfrm>
+          <a:prstGeom prst="rect">
+            <a:avLst/>
+          </a:prstGeom>
+        </p:spPr>
+      </p:pic>
     </p:spTree>
     <p:extLst>
       <p:ext uri="{BB962C8B-B14F-4D97-AF65-F5344CB8AC3E}">
@@ -13547,6 +14002,18 @@
   <p:clrMapOvr>
     <a:masterClrMapping/>
   </p:clrMapOvr>
+  <mc:AlternateContent xmlns:mc="http://schemas.openxmlformats.org/markup-compatibility/2006">
+    <mc:Choice xmlns:p14="http://schemas.microsoft.com/office/powerpoint/2010/main" Requires="p14">
+      <p:transition spd="med" p14:dur="700">
+        <p:fade/>
+      </p:transition>
+    </mc:Choice>
+    <mc:Fallback>
+      <p:transition spd="med">
+        <p:fade/>
+      </p:transition>
+    </mc:Fallback>
+  </mc:AlternateContent>
 </p:sld>
 </file>
 
@@ -13728,6 +14195,36 @@
           </a:p>
         </p:txBody>
       </p:sp>
+      <p:pic>
+        <p:nvPicPr>
+          <p:cNvPr id="3" name="Picture 2">
+            <a:extLst>
+              <a:ext uri="{FF2B5EF4-FFF2-40B4-BE49-F238E27FC236}">
+                <a16:creationId xmlns:a16="http://schemas.microsoft.com/office/drawing/2014/main" id="{DDDDA244-F31F-BBC0-9048-47A696719F7F}"/>
+              </a:ext>
+            </a:extLst>
+          </p:cNvPr>
+          <p:cNvPicPr>
+            <a:picLocks noChangeAspect="1"/>
+          </p:cNvPicPr>
+          <p:nvPr/>
+        </p:nvPicPr>
+        <p:blipFill>
+          <a:blip r:embed="rId2"/>
+          <a:stretch>
+            <a:fillRect/>
+          </a:stretch>
+        </p:blipFill>
+        <p:spPr>
+          <a:xfrm>
+            <a:off x="10447178" y="5473148"/>
+            <a:ext cx="1595435" cy="1384852"/>
+          </a:xfrm>
+          <a:prstGeom prst="rect">
+            <a:avLst/>
+          </a:prstGeom>
+        </p:spPr>
+      </p:pic>
     </p:spTree>
     <p:extLst>
       <p:ext uri="{BB962C8B-B14F-4D97-AF65-F5344CB8AC3E}">
@@ -13738,6 +14235,18 @@
   <p:clrMapOvr>
     <a:masterClrMapping/>
   </p:clrMapOvr>
+  <mc:AlternateContent xmlns:mc="http://schemas.openxmlformats.org/markup-compatibility/2006">
+    <mc:Choice xmlns:p14="http://schemas.microsoft.com/office/powerpoint/2010/main" Requires="p14">
+      <p:transition spd="med" p14:dur="700">
+        <p:fade/>
+      </p:transition>
+    </mc:Choice>
+    <mc:Fallback>
+      <p:transition spd="med">
+        <p:fade/>
+      </p:transition>
+    </mc:Fallback>
+  </mc:AlternateContent>
 </p:sld>
 </file>
 

</xml_diff>

<commit_message>
Data Science w/ Adv. Python docs-update3
</commit_message>
<xml_diff>
--- a/data-science-adv-python/Data Science w Advanced Python.pptx
+++ b/data-science-adv-python/Data Science w Advanced Python.pptx
@@ -9284,13 +9284,13 @@
   <p:clrMapOvr>
     <a:masterClrMapping/>
   </p:clrMapOvr>
-  <mc:AlternateContent xmlns:mc="http://schemas.openxmlformats.org/markup-compatibility/2006">
-    <mc:Choice xmlns:p14="http://schemas.microsoft.com/office/powerpoint/2010/main" Requires="p14">
+  <mc:AlternateContent xmlns:mc="http://schemas.openxmlformats.org/markup-compatibility/2006" xmlns:p14="http://schemas.microsoft.com/office/powerpoint/2010/main">
+    <mc:Choice Requires="p14">
       <p:transition spd="med" p14:dur="700">
         <p:fade/>
       </p:transition>
     </mc:Choice>
-    <mc:Fallback>
+    <mc:Fallback xmlns="">
       <p:transition spd="med">
         <p:fade/>
       </p:transition>
@@ -9585,13 +9585,13 @@
   <p:clrMapOvr>
     <a:masterClrMapping/>
   </p:clrMapOvr>
-  <mc:AlternateContent xmlns:mc="http://schemas.openxmlformats.org/markup-compatibility/2006">
-    <mc:Choice xmlns:p14="http://schemas.microsoft.com/office/powerpoint/2010/main" Requires="p14">
+  <mc:AlternateContent xmlns:mc="http://schemas.openxmlformats.org/markup-compatibility/2006" xmlns:p14="http://schemas.microsoft.com/office/powerpoint/2010/main">
+    <mc:Choice Requires="p14">
       <p:transition spd="med" p14:dur="700">
         <p:fade/>
       </p:transition>
     </mc:Choice>
-    <mc:Fallback>
+    <mc:Fallback xmlns="">
       <p:transition spd="med">
         <p:fade/>
       </p:transition>
@@ -9827,13 +9827,13 @@
   <p:clrMapOvr>
     <a:masterClrMapping/>
   </p:clrMapOvr>
-  <mc:AlternateContent xmlns:mc="http://schemas.openxmlformats.org/markup-compatibility/2006">
-    <mc:Choice xmlns:p14="http://schemas.microsoft.com/office/powerpoint/2010/main" Requires="p14">
+  <mc:AlternateContent xmlns:mc="http://schemas.openxmlformats.org/markup-compatibility/2006" xmlns:p14="http://schemas.microsoft.com/office/powerpoint/2010/main">
+    <mc:Choice Requires="p14">
       <p:transition spd="med" p14:dur="700">
         <p:fade/>
       </p:transition>
     </mc:Choice>
-    <mc:Fallback>
+    <mc:Fallback xmlns="">
       <p:transition spd="med">
         <p:fade/>
       </p:transition>
@@ -9934,13 +9934,13 @@
   <p:clrMapOvr>
     <a:masterClrMapping/>
   </p:clrMapOvr>
-  <mc:AlternateContent xmlns:mc="http://schemas.openxmlformats.org/markup-compatibility/2006">
-    <mc:Choice xmlns:p14="http://schemas.microsoft.com/office/powerpoint/2010/main" Requires="p14">
+  <mc:AlternateContent xmlns:mc="http://schemas.openxmlformats.org/markup-compatibility/2006" xmlns:p14="http://schemas.microsoft.com/office/powerpoint/2010/main">
+    <mc:Choice Requires="p14">
       <p:transition spd="med" p14:dur="700">
         <p:fade/>
       </p:transition>
     </mc:Choice>
-    <mc:Fallback>
+    <mc:Fallback xmlns="">
       <p:transition spd="med">
         <p:fade/>
       </p:transition>
@@ -10450,13 +10450,13 @@
   <p:clrMapOvr>
     <a:masterClrMapping/>
   </p:clrMapOvr>
-  <mc:AlternateContent xmlns:mc="http://schemas.openxmlformats.org/markup-compatibility/2006">
-    <mc:Choice xmlns:p14="http://schemas.microsoft.com/office/powerpoint/2010/main" Requires="p14">
+  <mc:AlternateContent xmlns:mc="http://schemas.openxmlformats.org/markup-compatibility/2006" xmlns:p14="http://schemas.microsoft.com/office/powerpoint/2010/main">
+    <mc:Choice Requires="p14">
       <p:transition spd="med" p14:dur="700">
         <p:fade/>
       </p:transition>
     </mc:Choice>
-    <mc:Fallback>
+    <mc:Fallback xmlns="">
       <p:transition spd="med">
         <p:fade/>
       </p:transition>
@@ -10551,7 +10551,7 @@
             </a:pPr>
             <a:r>
               <a:rPr lang="en-US" dirty="0"/>
-              <a:t>To present concepts like Data Science and Machine Learning in a simple, illustrative way</a:t>
+              <a:t>To present concepts like Data in a simple, illustrative way</a:t>
             </a:r>
           </a:p>
           <a:p>
@@ -10561,7 +10561,7 @@
             </a:pPr>
             <a:r>
               <a:rPr lang="en-US" dirty="0"/>
-              <a:t>To practically demonstrate associated topics like EDA, data manipulation and touch upon data pre-processing, model training, prediction with Python, using a simple case study</a:t>
+              <a:t>To practically demonstrate associated topics like EDA and data</a:t>
             </a:r>
           </a:p>
           <a:p>
@@ -10613,13 +10613,13 @@
   <p:clrMapOvr>
     <a:masterClrMapping/>
   </p:clrMapOvr>
-  <mc:AlternateContent xmlns:mc="http://schemas.openxmlformats.org/markup-compatibility/2006">
-    <mc:Choice xmlns:p14="http://schemas.microsoft.com/office/powerpoint/2010/main" Requires="p14">
+  <mc:AlternateContent xmlns:mc="http://schemas.openxmlformats.org/markup-compatibility/2006" xmlns:p14="http://schemas.microsoft.com/office/powerpoint/2010/main">
+    <mc:Choice Requires="p14">
       <p:transition spd="med" p14:dur="700">
         <p:fade/>
       </p:transition>
     </mc:Choice>
-    <mc:Fallback>
+    <mc:Fallback xmlns="">
       <p:transition spd="med">
         <p:fade/>
       </p:transition>
@@ -11063,13 +11063,13 @@
   <p:clrMapOvr>
     <a:masterClrMapping/>
   </p:clrMapOvr>
-  <mc:AlternateContent xmlns:mc="http://schemas.openxmlformats.org/markup-compatibility/2006">
-    <mc:Choice xmlns:p14="http://schemas.microsoft.com/office/powerpoint/2010/main" Requires="p14">
+  <mc:AlternateContent xmlns:mc="http://schemas.openxmlformats.org/markup-compatibility/2006" xmlns:p14="http://schemas.microsoft.com/office/powerpoint/2010/main">
+    <mc:Choice Requires="p14">
       <p:transition spd="med" p14:dur="700">
         <p:fade/>
       </p:transition>
     </mc:Choice>
-    <mc:Fallback>
+    <mc:Fallback xmlns="">
       <p:transition spd="med">
         <p:fade/>
       </p:transition>
@@ -11888,13 +11888,13 @@
   <p:clrMapOvr>
     <a:masterClrMapping/>
   </p:clrMapOvr>
-  <mc:AlternateContent xmlns:mc="http://schemas.openxmlformats.org/markup-compatibility/2006">
-    <mc:Choice xmlns:p14="http://schemas.microsoft.com/office/powerpoint/2010/main" Requires="p14">
+  <mc:AlternateContent xmlns:mc="http://schemas.openxmlformats.org/markup-compatibility/2006" xmlns:p14="http://schemas.microsoft.com/office/powerpoint/2010/main">
+    <mc:Choice Requires="p14">
       <p:transition spd="med" p14:dur="700">
         <p:fade/>
       </p:transition>
     </mc:Choice>
-    <mc:Fallback>
+    <mc:Fallback xmlns="">
       <p:transition spd="med">
         <p:fade/>
       </p:transition>
@@ -12898,13 +12898,13 @@
   <p:clrMapOvr>
     <a:masterClrMapping/>
   </p:clrMapOvr>
-  <mc:AlternateContent xmlns:mc="http://schemas.openxmlformats.org/markup-compatibility/2006">
-    <mc:Choice xmlns:p14="http://schemas.microsoft.com/office/powerpoint/2010/main" Requires="p14">
+  <mc:AlternateContent xmlns:mc="http://schemas.openxmlformats.org/markup-compatibility/2006" xmlns:p14="http://schemas.microsoft.com/office/powerpoint/2010/main">
+    <mc:Choice Requires="p14">
       <p:transition spd="med" p14:dur="700">
         <p:fade/>
       </p:transition>
     </mc:Choice>
-    <mc:Fallback>
+    <mc:Fallback xmlns="">
       <p:transition spd="med">
         <p:fade/>
       </p:transition>
@@ -13188,13 +13188,13 @@
   <p:clrMapOvr>
     <a:masterClrMapping/>
   </p:clrMapOvr>
-  <mc:AlternateContent xmlns:mc="http://schemas.openxmlformats.org/markup-compatibility/2006">
-    <mc:Choice xmlns:p14="http://schemas.microsoft.com/office/powerpoint/2010/main" Requires="p14">
+  <mc:AlternateContent xmlns:mc="http://schemas.openxmlformats.org/markup-compatibility/2006" xmlns:p14="http://schemas.microsoft.com/office/powerpoint/2010/main">
+    <mc:Choice Requires="p14">
       <p:transition spd="med" p14:dur="700">
         <p:fade/>
       </p:transition>
     </mc:Choice>
-    <mc:Fallback>
+    <mc:Fallback xmlns="">
       <p:transition spd="med">
         <p:fade/>
       </p:transition>
@@ -13615,13 +13615,13 @@
   <p:clrMapOvr>
     <a:masterClrMapping/>
   </p:clrMapOvr>
-  <mc:AlternateContent xmlns:mc="http://schemas.openxmlformats.org/markup-compatibility/2006">
-    <mc:Choice xmlns:p14="http://schemas.microsoft.com/office/powerpoint/2010/main" Requires="p14">
+  <mc:AlternateContent xmlns:mc="http://schemas.openxmlformats.org/markup-compatibility/2006" xmlns:p14="http://schemas.microsoft.com/office/powerpoint/2010/main">
+    <mc:Choice Requires="p14">
       <p:transition spd="med" p14:dur="700">
         <p:fade/>
       </p:transition>
     </mc:Choice>
-    <mc:Fallback>
+    <mc:Fallback xmlns="">
       <p:transition spd="med">
         <p:fade/>
       </p:transition>
@@ -14002,13 +14002,13 @@
   <p:clrMapOvr>
     <a:masterClrMapping/>
   </p:clrMapOvr>
-  <mc:AlternateContent xmlns:mc="http://schemas.openxmlformats.org/markup-compatibility/2006">
-    <mc:Choice xmlns:p14="http://schemas.microsoft.com/office/powerpoint/2010/main" Requires="p14">
+  <mc:AlternateContent xmlns:mc="http://schemas.openxmlformats.org/markup-compatibility/2006" xmlns:p14="http://schemas.microsoft.com/office/powerpoint/2010/main">
+    <mc:Choice Requires="p14">
       <p:transition spd="med" p14:dur="700">
         <p:fade/>
       </p:transition>
     </mc:Choice>
-    <mc:Fallback>
+    <mc:Fallback xmlns="">
       <p:transition spd="med">
         <p:fade/>
       </p:transition>
@@ -14235,13 +14235,13 @@
   <p:clrMapOvr>
     <a:masterClrMapping/>
   </p:clrMapOvr>
-  <mc:AlternateContent xmlns:mc="http://schemas.openxmlformats.org/markup-compatibility/2006">
-    <mc:Choice xmlns:p14="http://schemas.microsoft.com/office/powerpoint/2010/main" Requires="p14">
+  <mc:AlternateContent xmlns:mc="http://schemas.openxmlformats.org/markup-compatibility/2006" xmlns:p14="http://schemas.microsoft.com/office/powerpoint/2010/main">
+    <mc:Choice Requires="p14">
       <p:transition spd="med" p14:dur="700">
         <p:fade/>
       </p:transition>
     </mc:Choice>
-    <mc:Fallback>
+    <mc:Fallback xmlns="">
       <p:transition spd="med">
         <p:fade/>
       </p:transition>

</xml_diff>

<commit_message>
Data Science w/ Adv. Python docs-update4
</commit_message>
<xml_diff>
--- a/data-science-adv-python/Data Science w Advanced Python.pptx
+++ b/data-science-adv-python/Data Science w Advanced Python.pptx
@@ -11007,7 +11007,7 @@
             </a:pPr>
             <a:r>
               <a:rPr lang="en-US" dirty="0"/>
-              <a:t>Conceptual understanding of Data Science, Pandas, dataframe, EDA, data manipulation</a:t>
+              <a:t>Conceptual understanding of Data Science</a:t>
             </a:r>
           </a:p>
           <a:p>
@@ -11017,9 +11017,38 @@
             </a:pPr>
             <a:r>
               <a:rPr lang="en-US" dirty="0"/>
-              <a:t>Conceptual understanding of Machine Learning, data pre-processing, model training and a brief on some machine learning models</a:t>
-            </a:r>
-            <a:endParaRPr lang="en-IN" dirty="0"/>
+              <a:t>Conceptual understanding of Pandas </a:t>
+            </a:r>
+          </a:p>
+          <a:p>
+            <a:pPr marL="285750" indent="-285750" algn="l">
+              <a:buFont typeface="Arial" panose="020B0604020202020204" pitchFamily="34" charset="0"/>
+              <a:buChar char="•"/>
+            </a:pPr>
+            <a:r>
+              <a:rPr lang="en-US" dirty="0"/>
+              <a:t>Conceptual understanding of Dataframe </a:t>
+            </a:r>
+          </a:p>
+          <a:p>
+            <a:pPr marL="285750" indent="-285750" algn="l">
+              <a:buFont typeface="Arial" panose="020B0604020202020204" pitchFamily="34" charset="0"/>
+              <a:buChar char="•"/>
+            </a:pPr>
+            <a:r>
+              <a:rPr lang="en-US" dirty="0"/>
+              <a:t>Conceptual understanding of EDA</a:t>
+            </a:r>
+          </a:p>
+          <a:p>
+            <a:pPr marL="285750" indent="-285750" algn="l">
+              <a:buFont typeface="Arial" panose="020B0604020202020204" pitchFamily="34" charset="0"/>
+              <a:buChar char="•"/>
+            </a:pPr>
+            <a:r>
+              <a:rPr lang="en-US" dirty="0"/>
+              <a:t>Conceptual understanding of Data manipulation</a:t>
+            </a:r>
           </a:p>
         </p:txBody>
       </p:sp>

</xml_diff>

<commit_message>
Excel-to-database-to-excel + other updates
</commit_message>
<xml_diff>
--- a/data-science-adv-python/Data Science w Advanced Python.pptx
+++ b/data-science-adv-python/Data Science w Advanced Python.pptx
@@ -846,7 +846,7 @@
           <a:p>
             <a:fld id="{7A9118D1-1B31-41C2-A8E6-5B8E81C10E1C}" type="datetimeFigureOut">
               <a:rPr lang="en-IN" smtClean="0"/>
-              <a:t>21-11-2022</a:t>
+              <a:t>22-11-2022</a:t>
             </a:fld>
             <a:endParaRPr lang="en-IN"/>
           </a:p>
@@ -1109,7 +1109,7 @@
           <a:p>
             <a:fld id="{7A9118D1-1B31-41C2-A8E6-5B8E81C10E1C}" type="datetimeFigureOut">
               <a:rPr lang="en-IN" smtClean="0"/>
-              <a:t>21-11-2022</a:t>
+              <a:t>22-11-2022</a:t>
             </a:fld>
             <a:endParaRPr lang="en-IN"/>
           </a:p>
@@ -1360,7 +1360,7 @@
           <a:p>
             <a:fld id="{7A9118D1-1B31-41C2-A8E6-5B8E81C10E1C}" type="datetimeFigureOut">
               <a:rPr lang="en-IN" smtClean="0"/>
-              <a:t>21-11-2022</a:t>
+              <a:t>22-11-2022</a:t>
             </a:fld>
             <a:endParaRPr lang="en-IN"/>
           </a:p>
@@ -1674,7 +1674,7 @@
           <a:p>
             <a:fld id="{7A9118D1-1B31-41C2-A8E6-5B8E81C10E1C}" type="datetimeFigureOut">
               <a:rPr lang="en-IN" smtClean="0"/>
-              <a:t>21-11-2022</a:t>
+              <a:t>22-11-2022</a:t>
             </a:fld>
             <a:endParaRPr lang="en-IN"/>
           </a:p>
@@ -2015,7 +2015,7 @@
           <a:p>
             <a:fld id="{7A9118D1-1B31-41C2-A8E6-5B8E81C10E1C}" type="datetimeFigureOut">
               <a:rPr lang="en-IN" smtClean="0"/>
-              <a:t>21-11-2022</a:t>
+              <a:t>22-11-2022</a:t>
             </a:fld>
             <a:endParaRPr lang="en-IN"/>
           </a:p>
@@ -2329,7 +2329,7 @@
           <a:p>
             <a:fld id="{7A9118D1-1B31-41C2-A8E6-5B8E81C10E1C}" type="datetimeFigureOut">
               <a:rPr lang="en-IN" smtClean="0"/>
-              <a:t>21-11-2022</a:t>
+              <a:t>22-11-2022</a:t>
             </a:fld>
             <a:endParaRPr lang="en-IN"/>
           </a:p>
@@ -2722,7 +2722,7 @@
           <a:p>
             <a:fld id="{7A9118D1-1B31-41C2-A8E6-5B8E81C10E1C}" type="datetimeFigureOut">
               <a:rPr lang="en-IN" smtClean="0"/>
-              <a:t>21-11-2022</a:t>
+              <a:t>22-11-2022</a:t>
             </a:fld>
             <a:endParaRPr lang="en-IN"/>
           </a:p>
@@ -2892,7 +2892,7 @@
           <a:p>
             <a:fld id="{7A9118D1-1B31-41C2-A8E6-5B8E81C10E1C}" type="datetimeFigureOut">
               <a:rPr lang="en-IN" smtClean="0"/>
-              <a:t>21-11-2022</a:t>
+              <a:t>22-11-2022</a:t>
             </a:fld>
             <a:endParaRPr lang="en-IN"/>
           </a:p>
@@ -3072,7 +3072,7 @@
           <a:p>
             <a:fld id="{7A9118D1-1B31-41C2-A8E6-5B8E81C10E1C}" type="datetimeFigureOut">
               <a:rPr lang="en-IN" smtClean="0"/>
-              <a:t>21-11-2022</a:t>
+              <a:t>22-11-2022</a:t>
             </a:fld>
             <a:endParaRPr lang="en-IN"/>
           </a:p>
@@ -3282,7 +3282,7 @@
           <a:p>
             <a:fld id="{EBBFA983-B8F2-455D-9C39-92378F55643C}" type="datetimeFigureOut">
               <a:rPr lang="en-IN" smtClean="0"/>
-              <a:t>21-11-2022</a:t>
+              <a:t>22-11-2022</a:t>
             </a:fld>
             <a:endParaRPr lang="en-IN"/>
           </a:p>
@@ -3482,7 +3482,7 @@
           <a:p>
             <a:fld id="{EBBFA983-B8F2-455D-9C39-92378F55643C}" type="datetimeFigureOut">
               <a:rPr lang="en-IN" smtClean="0"/>
-              <a:t>21-11-2022</a:t>
+              <a:t>22-11-2022</a:t>
             </a:fld>
             <a:endParaRPr lang="en-IN"/>
           </a:p>
@@ -3624,7 +3624,7 @@
           <a:p>
             <a:fld id="{7A9118D1-1B31-41C2-A8E6-5B8E81C10E1C}" type="datetimeFigureOut">
               <a:rPr lang="en-IN" smtClean="0"/>
-              <a:t>21-11-2022</a:t>
+              <a:t>22-11-2022</a:t>
             </a:fld>
             <a:endParaRPr lang="en-IN"/>
           </a:p>
@@ -3900,7 +3900,7 @@
           <a:p>
             <a:fld id="{EBBFA983-B8F2-455D-9C39-92378F55643C}" type="datetimeFigureOut">
               <a:rPr lang="en-IN" smtClean="0"/>
-              <a:t>21-11-2022</a:t>
+              <a:t>22-11-2022</a:t>
             </a:fld>
             <a:endParaRPr lang="en-IN"/>
           </a:p>
@@ -4168,7 +4168,7 @@
           <a:p>
             <a:fld id="{EBBFA983-B8F2-455D-9C39-92378F55643C}" type="datetimeFigureOut">
               <a:rPr lang="en-IN" smtClean="0"/>
-              <a:t>21-11-2022</a:t>
+              <a:t>22-11-2022</a:t>
             </a:fld>
             <a:endParaRPr lang="en-IN"/>
           </a:p>
@@ -4583,7 +4583,7 @@
           <a:p>
             <a:fld id="{EBBFA983-B8F2-455D-9C39-92378F55643C}" type="datetimeFigureOut">
               <a:rPr lang="en-IN" smtClean="0"/>
-              <a:t>21-11-2022</a:t>
+              <a:t>22-11-2022</a:t>
             </a:fld>
             <a:endParaRPr lang="en-IN"/>
           </a:p>
@@ -4725,7 +4725,7 @@
           <a:p>
             <a:fld id="{EBBFA983-B8F2-455D-9C39-92378F55643C}" type="datetimeFigureOut">
               <a:rPr lang="en-IN" smtClean="0"/>
-              <a:t>21-11-2022</a:t>
+              <a:t>22-11-2022</a:t>
             </a:fld>
             <a:endParaRPr lang="en-IN"/>
           </a:p>
@@ -4838,7 +4838,7 @@
           <a:p>
             <a:fld id="{EBBFA983-B8F2-455D-9C39-92378F55643C}" type="datetimeFigureOut">
               <a:rPr lang="en-IN" smtClean="0"/>
-              <a:t>21-11-2022</a:t>
+              <a:t>22-11-2022</a:t>
             </a:fld>
             <a:endParaRPr lang="en-IN"/>
           </a:p>
@@ -5151,7 +5151,7 @@
           <a:p>
             <a:fld id="{EBBFA983-B8F2-455D-9C39-92378F55643C}" type="datetimeFigureOut">
               <a:rPr lang="en-IN" smtClean="0"/>
-              <a:t>21-11-2022</a:t>
+              <a:t>22-11-2022</a:t>
             </a:fld>
             <a:endParaRPr lang="en-IN"/>
           </a:p>
@@ -5440,7 +5440,7 @@
           <a:p>
             <a:fld id="{EBBFA983-B8F2-455D-9C39-92378F55643C}" type="datetimeFigureOut">
               <a:rPr lang="en-IN" smtClean="0"/>
-              <a:t>21-11-2022</a:t>
+              <a:t>22-11-2022</a:t>
             </a:fld>
             <a:endParaRPr lang="en-IN"/>
           </a:p>
@@ -5640,7 +5640,7 @@
           <a:p>
             <a:fld id="{EBBFA983-B8F2-455D-9C39-92378F55643C}" type="datetimeFigureOut">
               <a:rPr lang="en-IN" smtClean="0"/>
-              <a:t>21-11-2022</a:t>
+              <a:t>22-11-2022</a:t>
             </a:fld>
             <a:endParaRPr lang="en-IN"/>
           </a:p>
@@ -5850,7 +5850,7 @@
           <a:p>
             <a:fld id="{EBBFA983-B8F2-455D-9C39-92378F55643C}" type="datetimeFigureOut">
               <a:rPr lang="en-IN" smtClean="0"/>
-              <a:t>21-11-2022</a:t>
+              <a:t>22-11-2022</a:t>
             </a:fld>
             <a:endParaRPr lang="en-IN"/>
           </a:p>
@@ -6038,7 +6038,7 @@
           <a:p>
             <a:fld id="{7A9118D1-1B31-41C2-A8E6-5B8E81C10E1C}" type="datetimeFigureOut">
               <a:rPr lang="en-IN" smtClean="0"/>
-              <a:t>21-11-2022</a:t>
+              <a:t>22-11-2022</a:t>
             </a:fld>
             <a:endParaRPr lang="en-IN"/>
           </a:p>
@@ -6285,7 +6285,7 @@
           <a:p>
             <a:fld id="{7A9118D1-1B31-41C2-A8E6-5B8E81C10E1C}" type="datetimeFigureOut">
               <a:rPr lang="en-IN" smtClean="0"/>
-              <a:t>21-11-2022</a:t>
+              <a:t>22-11-2022</a:t>
             </a:fld>
             <a:endParaRPr lang="en-IN"/>
           </a:p>
@@ -6517,7 +6517,7 @@
           <a:p>
             <a:fld id="{7A9118D1-1B31-41C2-A8E6-5B8E81C10E1C}" type="datetimeFigureOut">
               <a:rPr lang="en-IN" smtClean="0"/>
-              <a:t>21-11-2022</a:t>
+              <a:t>22-11-2022</a:t>
             </a:fld>
             <a:endParaRPr lang="en-IN"/>
           </a:p>
@@ -6891,7 +6891,7 @@
           <a:p>
             <a:fld id="{7A9118D1-1B31-41C2-A8E6-5B8E81C10E1C}" type="datetimeFigureOut">
               <a:rPr lang="en-IN" smtClean="0"/>
-              <a:t>21-11-2022</a:t>
+              <a:t>22-11-2022</a:t>
             </a:fld>
             <a:endParaRPr lang="en-IN"/>
           </a:p>
@@ -7014,7 +7014,7 @@
           <a:p>
             <a:fld id="{7A9118D1-1B31-41C2-A8E6-5B8E81C10E1C}" type="datetimeFigureOut">
               <a:rPr lang="en-IN" smtClean="0"/>
-              <a:t>21-11-2022</a:t>
+              <a:t>22-11-2022</a:t>
             </a:fld>
             <a:endParaRPr lang="en-IN"/>
           </a:p>
@@ -7109,7 +7109,7 @@
           <a:p>
             <a:fld id="{7A9118D1-1B31-41C2-A8E6-5B8E81C10E1C}" type="datetimeFigureOut">
               <a:rPr lang="en-IN" smtClean="0"/>
-              <a:t>21-11-2022</a:t>
+              <a:t>22-11-2022</a:t>
             </a:fld>
             <a:endParaRPr lang="en-IN"/>
           </a:p>
@@ -7364,7 +7364,7 @@
           <a:p>
             <a:fld id="{7A9118D1-1B31-41C2-A8E6-5B8E81C10E1C}" type="datetimeFigureOut">
               <a:rPr lang="en-IN" smtClean="0"/>
-              <a:t>21-11-2022</a:t>
+              <a:t>22-11-2022</a:t>
             </a:fld>
             <a:endParaRPr lang="en-IN"/>
           </a:p>
@@ -8107,7 +8107,7 @@
           <a:p>
             <a:fld id="{7A9118D1-1B31-41C2-A8E6-5B8E81C10E1C}" type="datetimeFigureOut">
               <a:rPr lang="en-IN" smtClean="0"/>
-              <a:t>21-11-2022</a:t>
+              <a:t>22-11-2022</a:t>
             </a:fld>
             <a:endParaRPr lang="en-IN"/>
           </a:p>
@@ -8785,7 +8785,7 @@
           <a:p>
             <a:fld id="{EBBFA983-B8F2-455D-9C39-92378F55643C}" type="datetimeFigureOut">
               <a:rPr lang="en-IN" smtClean="0"/>
-              <a:t>21-11-2022</a:t>
+              <a:t>22-11-2022</a:t>
             </a:fld>
             <a:endParaRPr lang="en-IN"/>
           </a:p>

</xml_diff>